<commit_message>
Update TALLER 2 PRESENTACIÓN.pptx
Se añadió el punto Singleton a la presentación
</commit_message>
<xml_diff>
--- a/Presentación/TALLER 2 PRESENTACIÓN.pptx
+++ b/Presentación/TALLER 2 PRESENTACIÓN.pptx
@@ -111,6 +111,11 @@
       </a:defRPr>
     </a:lvl9pPr>
   </p:defaultTextStyle>
+  <p:extLst>
+    <p:ext uri="{EFAFB233-063F-42B5-8137-9DF3F51BA10A}">
+      <p15:sldGuideLst xmlns:p15="http://schemas.microsoft.com/office/powerpoint/2012/main"/>
+    </p:ext>
+  </p:extLst>
 </p:presentation>
 </file>
 
@@ -209,7 +214,7 @@
           <a:effectLst/>
           <a:extLst>
             <a:ext uri="{91240B29-F687-4f45-9708-019B960494DF}">
-              <a14:hiddenLine xmlns="" xmlns:a14="http://schemas.microsoft.com/office/drawing/2010/main" w="9525">
+              <a14:hiddenLine xmlns:a14="http://schemas.microsoft.com/office/drawing/2010/main" xmlns="" w="9525">
                 <a:solidFill>
                   <a:srgbClr val="000000"/>
                 </a:solidFill>
@@ -1731,7 +1736,7 @@
           <a:ln/>
           <a:extLst>
             <a:ext uri="{91240B29-F687-4f45-9708-019B960494DF}">
-              <a14:hiddenLine xmlns="" xmlns:a14="http://schemas.microsoft.com/office/drawing/2010/main" w="9525">
+              <a14:hiddenLine xmlns:a14="http://schemas.microsoft.com/office/drawing/2010/main" xmlns="" w="9525">
                 <a:solidFill>
                   <a:srgbClr val="000000"/>
                 </a:solidFill>
@@ -2006,7 +2011,7 @@
           <a:ln/>
           <a:extLst>
             <a:ext uri="{91240B29-F687-4f45-9708-019B960494DF}">
-              <a14:hiddenLine xmlns="" xmlns:a14="http://schemas.microsoft.com/office/drawing/2010/main" w="9525">
+              <a14:hiddenLine xmlns:a14="http://schemas.microsoft.com/office/drawing/2010/main" xmlns="" w="9525">
                 <a:solidFill>
                   <a:srgbClr val="000000"/>
                 </a:solidFill>
@@ -2289,7 +2294,7 @@
           <a:ln/>
           <a:extLst>
             <a:ext uri="{91240B29-F687-4f45-9708-019B960494DF}">
-              <a14:hiddenLine xmlns="" xmlns:a14="http://schemas.microsoft.com/office/drawing/2010/main" w="9525">
+              <a14:hiddenLine xmlns:a14="http://schemas.microsoft.com/office/drawing/2010/main" xmlns="" w="9525">
                 <a:solidFill>
                   <a:srgbClr val="000000"/>
                 </a:solidFill>
@@ -2915,7 +2920,7 @@
           <a:ln/>
           <a:extLst>
             <a:ext uri="{91240B29-F687-4f45-9708-019B960494DF}">
-              <a14:hiddenLine xmlns="" xmlns:a14="http://schemas.microsoft.com/office/drawing/2010/main" w="9525">
+              <a14:hiddenLine xmlns:a14="http://schemas.microsoft.com/office/drawing/2010/main" xmlns="" w="9525">
                 <a:solidFill>
                   <a:srgbClr val="000000"/>
                 </a:solidFill>
@@ -3254,7 +3259,7 @@
           <a:ln/>
           <a:extLst>
             <a:ext uri="{91240B29-F687-4f45-9708-019B960494DF}">
-              <a14:hiddenLine xmlns="" xmlns:a14="http://schemas.microsoft.com/office/drawing/2010/main" w="9525">
+              <a14:hiddenLine xmlns:a14="http://schemas.microsoft.com/office/drawing/2010/main" xmlns="" w="9525">
                 <a:solidFill>
                   <a:srgbClr val="000000"/>
                 </a:solidFill>
@@ -3731,7 +3736,7 @@
           <a:ln/>
           <a:extLst>
             <a:ext uri="{91240B29-F687-4f45-9708-019B960494DF}">
-              <a14:hiddenLine xmlns="" xmlns:a14="http://schemas.microsoft.com/office/drawing/2010/main" w="9525">
+              <a14:hiddenLine xmlns:a14="http://schemas.microsoft.com/office/drawing/2010/main" xmlns="" w="9525">
                 <a:solidFill>
                   <a:srgbClr val="000000"/>
                 </a:solidFill>
@@ -4160,7 +4165,7 @@
           <a:ln/>
           <a:extLst>
             <a:ext uri="{91240B29-F687-4f45-9708-019B960494DF}">
-              <a14:hiddenLine xmlns="" xmlns:a14="http://schemas.microsoft.com/office/drawing/2010/main" w="9525">
+              <a14:hiddenLine xmlns:a14="http://schemas.microsoft.com/office/drawing/2010/main" xmlns="" w="9525">
                 <a:solidFill>
                   <a:srgbClr val="000000"/>
                 </a:solidFill>
@@ -5700,18 +5705,181 @@
             <p:ph idx="1"/>
           </p:nvPr>
         </p:nvSpPr>
-        <p:spPr/>
-        <p:txBody>
-          <a:bodyPr/>
-          <a:lstStyle/>
-          <a:p>
-            <a:r>
-              <a:rPr lang="es-CO" dirty="0"/>
-              <a:t>LOREM IPSUM</a:t>
-            </a:r>
-          </a:p>
-        </p:txBody>
-      </p:sp>
+        <p:spPr>
+          <a:xfrm>
+            <a:off x="675783" y="2747833"/>
+            <a:ext cx="4033366" cy="3606386"/>
+          </a:xfrm>
+        </p:spPr>
+        <p:txBody>
+          <a:bodyPr>
+            <a:normAutofit lnSpcReduction="10000"/>
+          </a:bodyPr>
+          <a:lstStyle/>
+          <a:p>
+            <a:pPr>
+              <a:lnSpc>
+                <a:spcPct val="150000"/>
+              </a:lnSpc>
+            </a:pPr>
+            <a:r>
+              <a:rPr lang="es-ES" b="0" i="0" dirty="0" err="1">
+                <a:solidFill>
+                  <a:srgbClr val="F6F8FA"/>
+                </a:solidFill>
+                <a:effectLst/>
+                <a:latin typeface="SFMono-Regular"/>
+              </a:rPr>
+              <a:t>Singleton</a:t>
+            </a:r>
+            <a:r>
+              <a:rPr lang="es-ES" b="0" i="0" dirty="0">
+                <a:solidFill>
+                  <a:srgbClr val="F6F8FA"/>
+                </a:solidFill>
+                <a:effectLst/>
+                <a:latin typeface="SFMono-Regular"/>
+              </a:rPr>
+              <a:t> es un patrón de diseño del tipo creacional cuyo propósito es garantizar la existencia de una sola instancia de una clase. Además el acceso a esa única instancia tiene que ser global, esto se logra creando el objeto deseado en una clase y recuperándolo como una instancia estática.</a:t>
+            </a:r>
+            <a:endParaRPr lang="es-CO" dirty="0"/>
+          </a:p>
+        </p:txBody>
+      </p:sp>
+      <p:pic>
+        <p:nvPicPr>
+          <p:cNvPr id="5" name="Imagen 4">
+            <a:extLst>
+              <a:ext uri="{FF2B5EF4-FFF2-40B4-BE49-F238E27FC236}">
+                <a16:creationId xmlns:a16="http://schemas.microsoft.com/office/drawing/2014/main" id="{914375F5-4E9C-40CF-A28D-5828E01FD39A}"/>
+              </a:ext>
+            </a:extLst>
+          </p:cNvPr>
+          <p:cNvPicPr>
+            <a:picLocks noChangeAspect="1"/>
+          </p:cNvPicPr>
+          <p:nvPr/>
+        </p:nvPicPr>
+        <p:blipFill rotWithShape="1">
+          <a:blip r:embed="rId2">
+            <a:extLst>
+              <a:ext uri="{28A0092B-C50C-407E-A947-70E740481C1C}">
+                <a14:useLocalDpi xmlns:a14="http://schemas.microsoft.com/office/drawing/2010/main" val="0"/>
+              </a:ext>
+            </a:extLst>
+          </a:blip>
+          <a:srcRect l="35505" t="7280" r="35121" b="7152"/>
+          <a:stretch/>
+        </p:blipFill>
+        <p:spPr>
+          <a:xfrm>
+            <a:off x="5091953" y="2272551"/>
+            <a:ext cx="1401170" cy="4081668"/>
+          </a:xfrm>
+          <a:prstGeom prst="rect">
+            <a:avLst/>
+          </a:prstGeom>
+        </p:spPr>
+      </p:pic>
+      <p:sp>
+        <p:nvSpPr>
+          <p:cNvPr id="6" name="Símbolo &quot;No permitido&quot; 5">
+            <a:extLst>
+              <a:ext uri="{FF2B5EF4-FFF2-40B4-BE49-F238E27FC236}">
+                <a16:creationId xmlns:a16="http://schemas.microsoft.com/office/drawing/2014/main" id="{CED3CEDA-A9B5-4011-91FF-572213BBA78C}"/>
+              </a:ext>
+            </a:extLst>
+          </p:cNvPr>
+          <p:cNvSpPr/>
+          <p:nvPr/>
+        </p:nvSpPr>
+        <p:spPr>
+          <a:xfrm>
+            <a:off x="4680914" y="3667807"/>
+            <a:ext cx="2223247" cy="2339788"/>
+          </a:xfrm>
+          <a:prstGeom prst="noSmoking">
+            <a:avLst>
+              <a:gd name="adj" fmla="val 3022"/>
+            </a:avLst>
+          </a:prstGeom>
+        </p:spPr>
+        <p:style>
+          <a:lnRef idx="2">
+            <a:schemeClr val="accent1">
+              <a:shade val="50000"/>
+            </a:schemeClr>
+          </a:lnRef>
+          <a:fillRef idx="1">
+            <a:schemeClr val="accent1"/>
+          </a:fillRef>
+          <a:effectRef idx="0">
+            <a:schemeClr val="accent1"/>
+          </a:effectRef>
+          <a:fontRef idx="minor">
+            <a:schemeClr val="lt1"/>
+          </a:fontRef>
+        </p:style>
+        <p:txBody>
+          <a:bodyPr rtlCol="0" anchor="ctr"/>
+          <a:lstStyle/>
+          <a:p>
+            <a:pPr algn="ctr"/>
+            <a:endParaRPr lang="es-CO" dirty="0">
+              <a:solidFill>
+                <a:schemeClr val="tx1"/>
+              </a:solidFill>
+            </a:endParaRPr>
+          </a:p>
+        </p:txBody>
+      </p:sp>
+      <p:pic>
+        <p:nvPicPr>
+          <p:cNvPr id="1026" name="Picture 2" descr="Singleton">
+            <a:extLst>
+              <a:ext uri="{FF2B5EF4-FFF2-40B4-BE49-F238E27FC236}">
+                <a16:creationId xmlns:a16="http://schemas.microsoft.com/office/drawing/2014/main" id="{E5A0EE59-79C6-4BEF-AC01-006AD74D26D2}"/>
+              </a:ext>
+            </a:extLst>
+          </p:cNvPr>
+          <p:cNvPicPr>
+            <a:picLocks noChangeAspect="1" noChangeArrowheads="1"/>
+          </p:cNvPicPr>
+          <p:nvPr/>
+        </p:nvPicPr>
+        <p:blipFill>
+          <a:blip r:embed="rId3">
+            <a:extLst>
+              <a:ext uri="{28A0092B-C50C-407E-A947-70E740481C1C}">
+                <a14:useLocalDpi xmlns:a14="http://schemas.microsoft.com/office/drawing/2010/main" val="0"/>
+              </a:ext>
+            </a:extLst>
+          </a:blip>
+          <a:srcRect/>
+          <a:stretch>
+            <a:fillRect/>
+          </a:stretch>
+        </p:blipFill>
+        <p:spPr bwMode="auto">
+          <a:xfrm>
+            <a:off x="7147549" y="3932610"/>
+            <a:ext cx="4513169" cy="1810182"/>
+          </a:xfrm>
+          <a:prstGeom prst="rect">
+            <a:avLst/>
+          </a:prstGeom>
+          <a:noFill/>
+          <a:extLst>
+            <a:ext uri="{909E8E84-426E-40DD-AFC4-6F175D3DCCD1}">
+              <a14:hiddenFill xmlns:a14="http://schemas.microsoft.com/office/drawing/2010/main">
+                <a:solidFill>
+                  <a:srgbClr val="FFFFFF"/>
+                </a:solidFill>
+              </a14:hiddenFill>
+            </a:ext>
+          </a:extLst>
+        </p:spPr>
+      </p:pic>
     </p:spTree>
     <p:extLst>
       <p:ext uri="{BB962C8B-B14F-4D97-AF65-F5344CB8AC3E}">

</xml_diff>

<commit_message>
añadida definicion de delegado
</commit_message>
<xml_diff>
--- a/Presentación/TALLER 2 PRESENTACIÓN.pptx
+++ b/Presentación/TALLER 2 PRESENTACIÓN.pptx
@@ -215,7 +215,7 @@
           <a:effectLst/>
           <a:extLst>
             <a:ext uri="{91240B29-F687-4f45-9708-019B960494DF}">
-              <a14:hiddenLine xmlns:a14="http://schemas.microsoft.com/office/drawing/2010/main" xmlns="" w="9525">
+              <a14:hiddenLine xmlns="" xmlns:a14="http://schemas.microsoft.com/office/drawing/2010/main" w="9525">
                 <a:solidFill>
                   <a:srgbClr val="000000"/>
                 </a:solidFill>
@@ -407,7 +407,7 @@
           <a:p>
             <a:fld id="{7EC28AB7-34DE-4677-89C5-858D81803BAA}" type="datetimeFigureOut">
               <a:rPr lang="es-CO" smtClean="0"/>
-              <a:t>10/04/2024</a:t>
+              <a:t>11/04/2024</a:t>
             </a:fld>
             <a:endParaRPr lang="es-CO"/>
           </a:p>
@@ -725,7 +725,7 @@
           <a:p>
             <a:fld id="{7EC28AB7-34DE-4677-89C5-858D81803BAA}" type="datetimeFigureOut">
               <a:rPr lang="es-CO" smtClean="0"/>
-              <a:t>10/04/2024</a:t>
+              <a:t>11/04/2024</a:t>
             </a:fld>
             <a:endParaRPr lang="es-CO"/>
           </a:p>
@@ -1213,7 +1213,7 @@
           <a:p>
             <a:fld id="{7EC28AB7-34DE-4677-89C5-858D81803BAA}" type="datetimeFigureOut">
               <a:rPr lang="es-CO" smtClean="0"/>
-              <a:t>10/04/2024</a:t>
+              <a:t>11/04/2024</a:t>
             </a:fld>
             <a:endParaRPr lang="es-CO"/>
           </a:p>
@@ -1582,7 +1582,7 @@
           <a:p>
             <a:fld id="{7EC28AB7-34DE-4677-89C5-858D81803BAA}" type="datetimeFigureOut">
               <a:rPr lang="es-CO" smtClean="0"/>
-              <a:t>10/04/2024</a:t>
+              <a:t>11/04/2024</a:t>
             </a:fld>
             <a:endParaRPr lang="es-CO"/>
           </a:p>
@@ -1737,7 +1737,7 @@
           <a:ln/>
           <a:extLst>
             <a:ext uri="{91240B29-F687-4f45-9708-019B960494DF}">
-              <a14:hiddenLine xmlns:a14="http://schemas.microsoft.com/office/drawing/2010/main" xmlns="" w="9525">
+              <a14:hiddenLine xmlns="" xmlns:a14="http://schemas.microsoft.com/office/drawing/2010/main" w="9525">
                 <a:solidFill>
                   <a:srgbClr val="000000"/>
                 </a:solidFill>
@@ -1855,7 +1855,7 @@
           <a:p>
             <a:fld id="{7EC28AB7-34DE-4677-89C5-858D81803BAA}" type="datetimeFigureOut">
               <a:rPr lang="es-CO" smtClean="0"/>
-              <a:t>10/04/2024</a:t>
+              <a:t>11/04/2024</a:t>
             </a:fld>
             <a:endParaRPr lang="es-CO"/>
           </a:p>
@@ -2012,7 +2012,7 @@
           <a:ln/>
           <a:extLst>
             <a:ext uri="{91240B29-F687-4f45-9708-019B960494DF}">
-              <a14:hiddenLine xmlns:a14="http://schemas.microsoft.com/office/drawing/2010/main" xmlns="" w="9525">
+              <a14:hiddenLine xmlns="" xmlns:a14="http://schemas.microsoft.com/office/drawing/2010/main" w="9525">
                 <a:solidFill>
                   <a:srgbClr val="000000"/>
                 </a:solidFill>
@@ -2140,7 +2140,7 @@
           <a:p>
             <a:fld id="{7EC28AB7-34DE-4677-89C5-858D81803BAA}" type="datetimeFigureOut">
               <a:rPr lang="es-CO" smtClean="0"/>
-              <a:t>10/04/2024</a:t>
+              <a:t>11/04/2024</a:t>
             </a:fld>
             <a:endParaRPr lang="es-CO"/>
           </a:p>
@@ -2295,7 +2295,7 @@
           <a:ln/>
           <a:extLst>
             <a:ext uri="{91240B29-F687-4f45-9708-019B960494DF}">
-              <a14:hiddenLine xmlns:a14="http://schemas.microsoft.com/office/drawing/2010/main" xmlns="" w="9525">
+              <a14:hiddenLine xmlns="" xmlns:a14="http://schemas.microsoft.com/office/drawing/2010/main" w="9525">
                 <a:solidFill>
                   <a:srgbClr val="000000"/>
                 </a:solidFill>
@@ -2423,7 +2423,7 @@
           <a:p>
             <a:fld id="{7EC28AB7-34DE-4677-89C5-858D81803BAA}" type="datetimeFigureOut">
               <a:rPr lang="es-CO" smtClean="0"/>
-              <a:t>10/04/2024</a:t>
+              <a:t>11/04/2024</a:t>
             </a:fld>
             <a:endParaRPr lang="es-CO"/>
           </a:p>
@@ -2766,7 +2766,7 @@
           <a:p>
             <a:fld id="{7EC28AB7-34DE-4677-89C5-858D81803BAA}" type="datetimeFigureOut">
               <a:rPr lang="es-CO" smtClean="0"/>
-              <a:t>10/04/2024</a:t>
+              <a:t>11/04/2024</a:t>
             </a:fld>
             <a:endParaRPr lang="es-CO"/>
           </a:p>
@@ -2921,7 +2921,7 @@
           <a:ln/>
           <a:extLst>
             <a:ext uri="{91240B29-F687-4f45-9708-019B960494DF}">
-              <a14:hiddenLine xmlns:a14="http://schemas.microsoft.com/office/drawing/2010/main" xmlns="" w="9525">
+              <a14:hiddenLine xmlns="" xmlns:a14="http://schemas.microsoft.com/office/drawing/2010/main" w="9525">
                 <a:solidFill>
                   <a:srgbClr val="000000"/>
                 </a:solidFill>
@@ -3105,7 +3105,7 @@
           <a:p>
             <a:fld id="{7EC28AB7-34DE-4677-89C5-858D81803BAA}" type="datetimeFigureOut">
               <a:rPr lang="es-CO" smtClean="0"/>
-              <a:t>10/04/2024</a:t>
+              <a:t>11/04/2024</a:t>
             </a:fld>
             <a:endParaRPr lang="es-CO"/>
           </a:p>
@@ -3260,7 +3260,7 @@
           <a:ln/>
           <a:extLst>
             <a:ext uri="{91240B29-F687-4f45-9708-019B960494DF}">
-              <a14:hiddenLine xmlns:a14="http://schemas.microsoft.com/office/drawing/2010/main" xmlns="" w="9525">
+              <a14:hiddenLine xmlns="" xmlns:a14="http://schemas.microsoft.com/office/drawing/2010/main" w="9525">
                 <a:solidFill>
                   <a:srgbClr val="000000"/>
                 </a:solidFill>
@@ -3582,7 +3582,7 @@
           <a:p>
             <a:fld id="{7EC28AB7-34DE-4677-89C5-858D81803BAA}" type="datetimeFigureOut">
               <a:rPr lang="es-CO" smtClean="0"/>
-              <a:t>10/04/2024</a:t>
+              <a:t>11/04/2024</a:t>
             </a:fld>
             <a:endParaRPr lang="es-CO"/>
           </a:p>
@@ -3737,7 +3737,7 @@
           <a:ln/>
           <a:extLst>
             <a:ext uri="{91240B29-F687-4f45-9708-019B960494DF}">
-              <a14:hiddenLine xmlns:a14="http://schemas.microsoft.com/office/drawing/2010/main" xmlns="" w="9525">
+              <a14:hiddenLine xmlns="" xmlns:a14="http://schemas.microsoft.com/office/drawing/2010/main" w="9525">
                 <a:solidFill>
                   <a:srgbClr val="000000"/>
                 </a:solidFill>
@@ -3803,7 +3803,7 @@
           <a:p>
             <a:fld id="{7EC28AB7-34DE-4677-89C5-858D81803BAA}" type="datetimeFigureOut">
               <a:rPr lang="es-CO" smtClean="0"/>
-              <a:t>10/04/2024</a:t>
+              <a:t>11/04/2024</a:t>
             </a:fld>
             <a:endParaRPr lang="es-CO"/>
           </a:p>
@@ -3898,7 +3898,7 @@
           <a:p>
             <a:fld id="{7EC28AB7-34DE-4677-89C5-858D81803BAA}" type="datetimeFigureOut">
               <a:rPr lang="es-CO" smtClean="0"/>
-              <a:t>10/04/2024</a:t>
+              <a:t>11/04/2024</a:t>
             </a:fld>
             <a:endParaRPr lang="es-CO"/>
           </a:p>
@@ -4166,7 +4166,7 @@
           <a:ln/>
           <a:extLst>
             <a:ext uri="{91240B29-F687-4f45-9708-019B960494DF}">
-              <a14:hiddenLine xmlns:a14="http://schemas.microsoft.com/office/drawing/2010/main" xmlns="" w="9525">
+              <a14:hiddenLine xmlns="" xmlns:a14="http://schemas.microsoft.com/office/drawing/2010/main" w="9525">
                 <a:solidFill>
                   <a:srgbClr val="000000"/>
                 </a:solidFill>
@@ -4365,7 +4365,7 @@
           <a:p>
             <a:fld id="{7EC28AB7-34DE-4677-89C5-858D81803BAA}" type="datetimeFigureOut">
               <a:rPr lang="es-CO" smtClean="0"/>
-              <a:t>10/04/2024</a:t>
+              <a:t>11/04/2024</a:t>
             </a:fld>
             <a:endParaRPr lang="es-CO"/>
           </a:p>
@@ -4678,7 +4678,7 @@
           <a:p>
             <a:fld id="{7EC28AB7-34DE-4677-89C5-858D81803BAA}" type="datetimeFigureOut">
               <a:rPr lang="es-CO" smtClean="0"/>
-              <a:t>10/04/2024</a:t>
+              <a:t>11/04/2024</a:t>
             </a:fld>
             <a:endParaRPr lang="es-CO"/>
           </a:p>
@@ -4948,7 +4948,7 @@
           <a:p>
             <a:fld id="{7EC28AB7-34DE-4677-89C5-858D81803BAA}" type="datetimeFigureOut">
               <a:rPr lang="es-CO" smtClean="0"/>
-              <a:t>10/04/2024</a:t>
+              <a:t>11/04/2024</a:t>
             </a:fld>
             <a:endParaRPr lang="es-CO"/>
           </a:p>
@@ -5540,9 +5540,28 @@
           <a:lstStyle/>
           <a:p>
             <a:r>
-              <a:rPr lang="es-CO" dirty="0"/>
-              <a:t>LOREN IPSUM</a:t>
-            </a:r>
+              <a:rPr lang="es-ES" dirty="0"/>
+              <a:t>Permite pasar métodos como argumentos a otros métodos, o almacenarlos como variables. Esto facilita la programación orientada a eventos y el diseño de patrones como el </a:t>
+            </a:r>
+            <a:r>
+              <a:rPr lang="es-ES" dirty="0" err="1"/>
+              <a:t>Observer</a:t>
+            </a:r>
+            <a:r>
+              <a:rPr lang="es-ES"/>
+              <a:t>.</a:t>
+            </a:r>
+          </a:p>
+          <a:p>
+            <a:r>
+              <a:rPr lang="es-ES"/>
+              <a:t>Los </a:t>
+            </a:r>
+            <a:r>
+              <a:rPr lang="es-ES" dirty="0"/>
+              <a:t>delegados son útiles para representar métodos que tienen un tipo de retorno específico y una lista de parámetros definida. Cuando declaras un delegado, debes asegurarte de que su firma coincida con la firma de los métodos que planeas asignar a ese delegado.</a:t>
+            </a:r>
+            <a:endParaRPr lang="es-CO" dirty="0"/>
           </a:p>
         </p:txBody>
       </p:sp>

</xml_diff>

<commit_message>
Ciclo de Vida en Presentacióon
Se subió el ciclo de vida a la presentación de Power Point
</commit_message>
<xml_diff>
--- a/Presentación/TALLER 2 PRESENTACIÓN.pptx
+++ b/Presentación/TALLER 2 PRESENTACIÓN.pptx
@@ -12,8 +12,10 @@
     <p:sldId id="260" r:id="rId6"/>
     <p:sldId id="257" r:id="rId7"/>
     <p:sldId id="264" r:id="rId8"/>
-    <p:sldId id="262" r:id="rId9"/>
-    <p:sldId id="263" r:id="rId10"/>
+    <p:sldId id="265" r:id="rId9"/>
+    <p:sldId id="262" r:id="rId10"/>
+    <p:sldId id="266" r:id="rId11"/>
+    <p:sldId id="263" r:id="rId12"/>
   </p:sldIdLst>
   <p:sldSz cx="12192000" cy="6858000"/>
   <p:notesSz cx="6858000" cy="9144000"/>
@@ -215,7 +217,7 @@
           <a:effectLst/>
           <a:extLst>
             <a:ext uri="{91240B29-F687-4f45-9708-019B960494DF}">
-              <a14:hiddenLine xmlns="" xmlns:a14="http://schemas.microsoft.com/office/drawing/2010/main" w="9525">
+              <a14:hiddenLine xmlns:a14="http://schemas.microsoft.com/office/drawing/2010/main" xmlns="" w="9525">
                 <a:solidFill>
                   <a:srgbClr val="000000"/>
                 </a:solidFill>
@@ -407,7 +409,7 @@
           <a:p>
             <a:fld id="{7EC28AB7-34DE-4677-89C5-858D81803BAA}" type="datetimeFigureOut">
               <a:rPr lang="es-CO" smtClean="0"/>
-              <a:t>11/04/2024</a:t>
+              <a:t>12/04/2024</a:t>
             </a:fld>
             <a:endParaRPr lang="es-CO"/>
           </a:p>
@@ -725,7 +727,7 @@
           <a:p>
             <a:fld id="{7EC28AB7-34DE-4677-89C5-858D81803BAA}" type="datetimeFigureOut">
               <a:rPr lang="es-CO" smtClean="0"/>
-              <a:t>11/04/2024</a:t>
+              <a:t>12/04/2024</a:t>
             </a:fld>
             <a:endParaRPr lang="es-CO"/>
           </a:p>
@@ -1213,7 +1215,7 @@
           <a:p>
             <a:fld id="{7EC28AB7-34DE-4677-89C5-858D81803BAA}" type="datetimeFigureOut">
               <a:rPr lang="es-CO" smtClean="0"/>
-              <a:t>11/04/2024</a:t>
+              <a:t>12/04/2024</a:t>
             </a:fld>
             <a:endParaRPr lang="es-CO"/>
           </a:p>
@@ -1582,7 +1584,7 @@
           <a:p>
             <a:fld id="{7EC28AB7-34DE-4677-89C5-858D81803BAA}" type="datetimeFigureOut">
               <a:rPr lang="es-CO" smtClean="0"/>
-              <a:t>11/04/2024</a:t>
+              <a:t>12/04/2024</a:t>
             </a:fld>
             <a:endParaRPr lang="es-CO"/>
           </a:p>
@@ -1737,7 +1739,7 @@
           <a:ln/>
           <a:extLst>
             <a:ext uri="{91240B29-F687-4f45-9708-019B960494DF}">
-              <a14:hiddenLine xmlns="" xmlns:a14="http://schemas.microsoft.com/office/drawing/2010/main" w="9525">
+              <a14:hiddenLine xmlns:a14="http://schemas.microsoft.com/office/drawing/2010/main" xmlns="" w="9525">
                 <a:solidFill>
                   <a:srgbClr val="000000"/>
                 </a:solidFill>
@@ -1855,7 +1857,7 @@
           <a:p>
             <a:fld id="{7EC28AB7-34DE-4677-89C5-858D81803BAA}" type="datetimeFigureOut">
               <a:rPr lang="es-CO" smtClean="0"/>
-              <a:t>11/04/2024</a:t>
+              <a:t>12/04/2024</a:t>
             </a:fld>
             <a:endParaRPr lang="es-CO"/>
           </a:p>
@@ -2012,7 +2014,7 @@
           <a:ln/>
           <a:extLst>
             <a:ext uri="{91240B29-F687-4f45-9708-019B960494DF}">
-              <a14:hiddenLine xmlns="" xmlns:a14="http://schemas.microsoft.com/office/drawing/2010/main" w="9525">
+              <a14:hiddenLine xmlns:a14="http://schemas.microsoft.com/office/drawing/2010/main" xmlns="" w="9525">
                 <a:solidFill>
                   <a:srgbClr val="000000"/>
                 </a:solidFill>
@@ -2140,7 +2142,7 @@
           <a:p>
             <a:fld id="{7EC28AB7-34DE-4677-89C5-858D81803BAA}" type="datetimeFigureOut">
               <a:rPr lang="es-CO" smtClean="0"/>
-              <a:t>11/04/2024</a:t>
+              <a:t>12/04/2024</a:t>
             </a:fld>
             <a:endParaRPr lang="es-CO"/>
           </a:p>
@@ -2295,7 +2297,7 @@
           <a:ln/>
           <a:extLst>
             <a:ext uri="{91240B29-F687-4f45-9708-019B960494DF}">
-              <a14:hiddenLine xmlns="" xmlns:a14="http://schemas.microsoft.com/office/drawing/2010/main" w="9525">
+              <a14:hiddenLine xmlns:a14="http://schemas.microsoft.com/office/drawing/2010/main" xmlns="" w="9525">
                 <a:solidFill>
                   <a:srgbClr val="000000"/>
                 </a:solidFill>
@@ -2423,7 +2425,7 @@
           <a:p>
             <a:fld id="{7EC28AB7-34DE-4677-89C5-858D81803BAA}" type="datetimeFigureOut">
               <a:rPr lang="es-CO" smtClean="0"/>
-              <a:t>11/04/2024</a:t>
+              <a:t>12/04/2024</a:t>
             </a:fld>
             <a:endParaRPr lang="es-CO"/>
           </a:p>
@@ -2766,7 +2768,7 @@
           <a:p>
             <a:fld id="{7EC28AB7-34DE-4677-89C5-858D81803BAA}" type="datetimeFigureOut">
               <a:rPr lang="es-CO" smtClean="0"/>
-              <a:t>11/04/2024</a:t>
+              <a:t>12/04/2024</a:t>
             </a:fld>
             <a:endParaRPr lang="es-CO"/>
           </a:p>
@@ -2921,7 +2923,7 @@
           <a:ln/>
           <a:extLst>
             <a:ext uri="{91240B29-F687-4f45-9708-019B960494DF}">
-              <a14:hiddenLine xmlns="" xmlns:a14="http://schemas.microsoft.com/office/drawing/2010/main" w="9525">
+              <a14:hiddenLine xmlns:a14="http://schemas.microsoft.com/office/drawing/2010/main" xmlns="" w="9525">
                 <a:solidFill>
                   <a:srgbClr val="000000"/>
                 </a:solidFill>
@@ -3105,7 +3107,7 @@
           <a:p>
             <a:fld id="{7EC28AB7-34DE-4677-89C5-858D81803BAA}" type="datetimeFigureOut">
               <a:rPr lang="es-CO" smtClean="0"/>
-              <a:t>11/04/2024</a:t>
+              <a:t>12/04/2024</a:t>
             </a:fld>
             <a:endParaRPr lang="es-CO"/>
           </a:p>
@@ -3260,7 +3262,7 @@
           <a:ln/>
           <a:extLst>
             <a:ext uri="{91240B29-F687-4f45-9708-019B960494DF}">
-              <a14:hiddenLine xmlns="" xmlns:a14="http://schemas.microsoft.com/office/drawing/2010/main" w="9525">
+              <a14:hiddenLine xmlns:a14="http://schemas.microsoft.com/office/drawing/2010/main" xmlns="" w="9525">
                 <a:solidFill>
                   <a:srgbClr val="000000"/>
                 </a:solidFill>
@@ -3582,7 +3584,7 @@
           <a:p>
             <a:fld id="{7EC28AB7-34DE-4677-89C5-858D81803BAA}" type="datetimeFigureOut">
               <a:rPr lang="es-CO" smtClean="0"/>
-              <a:t>11/04/2024</a:t>
+              <a:t>12/04/2024</a:t>
             </a:fld>
             <a:endParaRPr lang="es-CO"/>
           </a:p>
@@ -3737,7 +3739,7 @@
           <a:ln/>
           <a:extLst>
             <a:ext uri="{91240B29-F687-4f45-9708-019B960494DF}">
-              <a14:hiddenLine xmlns="" xmlns:a14="http://schemas.microsoft.com/office/drawing/2010/main" w="9525">
+              <a14:hiddenLine xmlns:a14="http://schemas.microsoft.com/office/drawing/2010/main" xmlns="" w="9525">
                 <a:solidFill>
                   <a:srgbClr val="000000"/>
                 </a:solidFill>
@@ -3803,7 +3805,7 @@
           <a:p>
             <a:fld id="{7EC28AB7-34DE-4677-89C5-858D81803BAA}" type="datetimeFigureOut">
               <a:rPr lang="es-CO" smtClean="0"/>
-              <a:t>11/04/2024</a:t>
+              <a:t>12/04/2024</a:t>
             </a:fld>
             <a:endParaRPr lang="es-CO"/>
           </a:p>
@@ -3898,7 +3900,7 @@
           <a:p>
             <a:fld id="{7EC28AB7-34DE-4677-89C5-858D81803BAA}" type="datetimeFigureOut">
               <a:rPr lang="es-CO" smtClean="0"/>
-              <a:t>11/04/2024</a:t>
+              <a:t>12/04/2024</a:t>
             </a:fld>
             <a:endParaRPr lang="es-CO"/>
           </a:p>
@@ -4166,7 +4168,7 @@
           <a:ln/>
           <a:extLst>
             <a:ext uri="{91240B29-F687-4f45-9708-019B960494DF}">
-              <a14:hiddenLine xmlns="" xmlns:a14="http://schemas.microsoft.com/office/drawing/2010/main" w="9525">
+              <a14:hiddenLine xmlns:a14="http://schemas.microsoft.com/office/drawing/2010/main" xmlns="" w="9525">
                 <a:solidFill>
                   <a:srgbClr val="000000"/>
                 </a:solidFill>
@@ -4365,7 +4367,7 @@
           <a:p>
             <a:fld id="{7EC28AB7-34DE-4677-89C5-858D81803BAA}" type="datetimeFigureOut">
               <a:rPr lang="es-CO" smtClean="0"/>
-              <a:t>11/04/2024</a:t>
+              <a:t>12/04/2024</a:t>
             </a:fld>
             <a:endParaRPr lang="es-CO"/>
           </a:p>
@@ -4678,7 +4680,7 @@
           <a:p>
             <a:fld id="{7EC28AB7-34DE-4677-89C5-858D81803BAA}" type="datetimeFigureOut">
               <a:rPr lang="es-CO" smtClean="0"/>
-              <a:t>11/04/2024</a:t>
+              <a:t>12/04/2024</a:t>
             </a:fld>
             <a:endParaRPr lang="es-CO"/>
           </a:p>
@@ -4948,7 +4950,7 @@
           <a:p>
             <a:fld id="{7EC28AB7-34DE-4677-89C5-858D81803BAA}" type="datetimeFigureOut">
               <a:rPr lang="es-CO" smtClean="0"/>
-              <a:t>11/04/2024</a:t>
+              <a:t>12/04/2024</a:t>
             </a:fld>
             <a:endParaRPr lang="es-CO"/>
           </a:p>
@@ -5473,6 +5475,234 @@
 </p:sld>
 </file>
 
+<file path=ppt/slides/slide10.xml><?xml version="1.0" encoding="utf-8"?>
+<p:sld xmlns:a="http://schemas.openxmlformats.org/drawingml/2006/main" xmlns:r="http://schemas.openxmlformats.org/officeDocument/2006/relationships" xmlns:p="http://schemas.openxmlformats.org/presentationml/2006/main">
+  <p:cSld>
+    <p:spTree>
+      <p:nvGrpSpPr>
+        <p:cNvPr id="1" name=""/>
+        <p:cNvGrpSpPr/>
+        <p:nvPr/>
+      </p:nvGrpSpPr>
+      <p:grpSpPr>
+        <a:xfrm>
+          <a:off x="0" y="0"/>
+          <a:ext cx="0" cy="0"/>
+          <a:chOff x="0" y="0"/>
+          <a:chExt cx="0" cy="0"/>
+        </a:xfrm>
+      </p:grpSpPr>
+      <p:sp>
+        <p:nvSpPr>
+          <p:cNvPr id="2" name="Título 1">
+            <a:extLst>
+              <a:ext uri="{FF2B5EF4-FFF2-40B4-BE49-F238E27FC236}">
+                <a16:creationId xmlns:a16="http://schemas.microsoft.com/office/drawing/2014/main" id="{5F94284C-2EFD-4684-A8BF-8EBE201F8ED5}"/>
+              </a:ext>
+            </a:extLst>
+          </p:cNvPr>
+          <p:cNvSpPr>
+            <a:spLocks noGrp="1"/>
+          </p:cNvSpPr>
+          <p:nvPr>
+            <p:ph type="title"/>
+          </p:nvPr>
+        </p:nvSpPr>
+        <p:spPr/>
+        <p:txBody>
+          <a:bodyPr/>
+          <a:lstStyle/>
+          <a:p>
+            <a:r>
+              <a:rPr lang="es-CO" dirty="0"/>
+              <a:t>CICLO DE VIDA EN UNA IMAGEN</a:t>
+            </a:r>
+          </a:p>
+        </p:txBody>
+      </p:sp>
+      <p:pic>
+        <p:nvPicPr>
+          <p:cNvPr id="4" name="Imagen 3">
+            <a:extLst>
+              <a:ext uri="{FF2B5EF4-FFF2-40B4-BE49-F238E27FC236}">
+                <a16:creationId xmlns:a16="http://schemas.microsoft.com/office/drawing/2014/main" id="{1B8EB86A-E516-4183-847B-A2C0B0805FCC}"/>
+              </a:ext>
+            </a:extLst>
+          </p:cNvPr>
+          <p:cNvPicPr>
+            <a:picLocks noChangeAspect="1"/>
+          </p:cNvPicPr>
+          <p:nvPr/>
+        </p:nvPicPr>
+        <p:blipFill rotWithShape="1">
+          <a:blip r:embed="rId2">
+            <a:extLst>
+              <a:ext uri="{28A0092B-C50C-407E-A947-70E740481C1C}">
+                <a14:useLocalDpi xmlns:a14="http://schemas.microsoft.com/office/drawing/2010/main" val="0"/>
+              </a:ext>
+            </a:extLst>
+          </a:blip>
+          <a:srcRect b="49405"/>
+          <a:stretch/>
+        </p:blipFill>
+        <p:spPr>
+          <a:xfrm>
+            <a:off x="640122" y="2592345"/>
+            <a:ext cx="4900424" cy="3469788"/>
+          </a:xfrm>
+          <a:prstGeom prst="rect">
+            <a:avLst/>
+          </a:prstGeom>
+        </p:spPr>
+      </p:pic>
+      <p:pic>
+        <p:nvPicPr>
+          <p:cNvPr id="6" name="Imagen 5">
+            <a:extLst>
+              <a:ext uri="{FF2B5EF4-FFF2-40B4-BE49-F238E27FC236}">
+                <a16:creationId xmlns:a16="http://schemas.microsoft.com/office/drawing/2014/main" id="{3F6D59B0-0F77-4284-9E6B-FE0535B08604}"/>
+              </a:ext>
+            </a:extLst>
+          </p:cNvPr>
+          <p:cNvPicPr>
+            <a:picLocks noChangeAspect="1"/>
+          </p:cNvPicPr>
+          <p:nvPr/>
+        </p:nvPicPr>
+        <p:blipFill rotWithShape="1">
+          <a:blip r:embed="rId2">
+            <a:extLst>
+              <a:ext uri="{28A0092B-C50C-407E-A947-70E740481C1C}">
+                <a14:useLocalDpi xmlns:a14="http://schemas.microsoft.com/office/drawing/2010/main" val="0"/>
+              </a:ext>
+            </a:extLst>
+          </a:blip>
+          <a:srcRect t="50848"/>
+          <a:stretch/>
+        </p:blipFill>
+        <p:spPr>
+          <a:xfrm>
+            <a:off x="5935133" y="2593079"/>
+            <a:ext cx="5043244" cy="3469054"/>
+          </a:xfrm>
+          <a:prstGeom prst="rect">
+            <a:avLst/>
+          </a:prstGeom>
+        </p:spPr>
+      </p:pic>
+    </p:spTree>
+    <p:extLst>
+      <p:ext uri="{BB962C8B-B14F-4D97-AF65-F5344CB8AC3E}">
+        <p14:creationId xmlns:p14="http://schemas.microsoft.com/office/powerpoint/2010/main" val="1328818983"/>
+      </p:ext>
+    </p:extLst>
+  </p:cSld>
+  <p:clrMapOvr>
+    <a:masterClrMapping/>
+  </p:clrMapOvr>
+</p:sld>
+</file>
+
+<file path=ppt/slides/slide11.xml><?xml version="1.0" encoding="utf-8"?>
+<p:sld xmlns:a="http://schemas.openxmlformats.org/drawingml/2006/main" xmlns:r="http://schemas.openxmlformats.org/officeDocument/2006/relationships" xmlns:p="http://schemas.openxmlformats.org/presentationml/2006/main">
+  <p:cSld>
+    <p:spTree>
+      <p:nvGrpSpPr>
+        <p:cNvPr id="1" name=""/>
+        <p:cNvGrpSpPr/>
+        <p:nvPr/>
+      </p:nvGrpSpPr>
+      <p:grpSpPr>
+        <a:xfrm>
+          <a:off x="0" y="0"/>
+          <a:ext cx="0" cy="0"/>
+          <a:chOff x="0" y="0"/>
+          <a:chExt cx="0" cy="0"/>
+        </a:xfrm>
+      </p:grpSpPr>
+      <p:sp>
+        <p:nvSpPr>
+          <p:cNvPr id="2" name="Título 1">
+            <a:extLst>
+              <a:ext uri="{FF2B5EF4-FFF2-40B4-BE49-F238E27FC236}">
+                <a16:creationId xmlns:a16="http://schemas.microsoft.com/office/drawing/2014/main" id="{C7239AB8-1FAD-430E-A0A5-6500C39A0E15}"/>
+              </a:ext>
+            </a:extLst>
+          </p:cNvPr>
+          <p:cNvSpPr>
+            <a:spLocks noGrp="1"/>
+          </p:cNvSpPr>
+          <p:nvPr>
+            <p:ph type="ctrTitle"/>
+          </p:nvPr>
+        </p:nvSpPr>
+        <p:spPr/>
+        <p:txBody>
+          <a:bodyPr/>
+          <a:lstStyle/>
+          <a:p>
+            <a:r>
+              <a:rPr lang="es-CO" dirty="0"/>
+              <a:t>GRACIAS POR SU ATENCIÓN</a:t>
+            </a:r>
+          </a:p>
+        </p:txBody>
+      </p:sp>
+      <p:sp>
+        <p:nvSpPr>
+          <p:cNvPr id="3" name="Subtítulo 2">
+            <a:extLst>
+              <a:ext uri="{FF2B5EF4-FFF2-40B4-BE49-F238E27FC236}">
+                <a16:creationId xmlns:a16="http://schemas.microsoft.com/office/drawing/2014/main" id="{23D17BA0-EAF4-423E-9415-724A8F32860B}"/>
+              </a:ext>
+            </a:extLst>
+          </p:cNvPr>
+          <p:cNvSpPr>
+            <a:spLocks noGrp="1"/>
+          </p:cNvSpPr>
+          <p:nvPr>
+            <p:ph type="subTitle" idx="1"/>
+          </p:nvPr>
+        </p:nvSpPr>
+        <p:spPr>
+          <a:xfrm>
+            <a:off x="810000" y="5561253"/>
+            <a:ext cx="10572000" cy="434974"/>
+          </a:xfrm>
+        </p:spPr>
+        <p:txBody>
+          <a:bodyPr>
+            <a:normAutofit fontScale="77500" lnSpcReduction="20000"/>
+          </a:bodyPr>
+          <a:lstStyle/>
+          <a:p>
+            <a:r>
+              <a:rPr lang="es-CO" dirty="0"/>
+              <a:t>Link al repositorio: </a:t>
+            </a:r>
+            <a:r>
+              <a:rPr lang="es-ES" dirty="0">
+                <a:hlinkClick r:id="rId2"/>
+              </a:rPr>
+              <a:t>EmmisFrh12/Taller-2-Scripting: En este repositorio subiremos los ejercicios del taller 2 🗿 (github.com)</a:t>
+            </a:r>
+            <a:endParaRPr lang="es-CO" dirty="0"/>
+          </a:p>
+        </p:txBody>
+      </p:sp>
+    </p:spTree>
+    <p:extLst>
+      <p:ext uri="{BB962C8B-B14F-4D97-AF65-F5344CB8AC3E}">
+        <p14:creationId xmlns:p14="http://schemas.microsoft.com/office/powerpoint/2010/main" val="1311023220"/>
+      </p:ext>
+    </p:extLst>
+  </p:cSld>
+  <p:clrMapOvr>
+    <a:masterClrMapping/>
+  </p:clrMapOvr>
+</p:sld>
+</file>
+
 <file path=ppt/slides/slide2.xml><?xml version="1.0" encoding="utf-8"?>
 <p:sld xmlns:a="http://schemas.openxmlformats.org/drawingml/2006/main" xmlns:r="http://schemas.openxmlformats.org/officeDocument/2006/relationships" xmlns:p="http://schemas.openxmlformats.org/presentationml/2006/main">
   <p:cSld>
@@ -6471,22 +6701,168 @@
             <p:ph idx="1"/>
           </p:nvPr>
         </p:nvSpPr>
-        <p:spPr/>
-        <p:txBody>
-          <a:bodyPr/>
-          <a:lstStyle/>
-          <a:p>
-            <a:r>
-              <a:rPr lang="es-CO" dirty="0"/>
-              <a:t>LOREN IPSUM</a:t>
-            </a:r>
+        <p:spPr>
+          <a:xfrm>
+            <a:off x="607046" y="2774301"/>
+            <a:ext cx="10269276" cy="3636511"/>
+          </a:xfrm>
+        </p:spPr>
+        <p:txBody>
+          <a:bodyPr>
+            <a:normAutofit fontScale="85000" lnSpcReduction="20000"/>
+          </a:bodyPr>
+          <a:lstStyle/>
+          <a:p>
+            <a:pPr marL="0" indent="0">
+              <a:buNone/>
+            </a:pPr>
+            <a:r>
+              <a:rPr lang="es-ES" dirty="0"/>
+              <a:t>El ciclo de vida de un script en </a:t>
+            </a:r>
+            <a:r>
+              <a:rPr lang="es-ES" dirty="0" err="1"/>
+              <a:t>unity</a:t>
+            </a:r>
+            <a:r>
+              <a:rPr lang="es-ES" dirty="0"/>
+              <a:t> se refiere a el orden en el que se ejecutan las funciones del script. Orden:</a:t>
+            </a:r>
+          </a:p>
+          <a:p>
+            <a:endParaRPr lang="es-ES" dirty="0"/>
+          </a:p>
+          <a:p>
+            <a:r>
+              <a:rPr lang="es-ES" dirty="0" err="1"/>
+              <a:t>Reset</a:t>
+            </a:r>
+            <a:r>
+              <a:rPr lang="es-ES" dirty="0"/>
+              <a:t>: El </a:t>
+            </a:r>
+            <a:r>
+              <a:rPr lang="es-ES" dirty="0" err="1"/>
+              <a:t>reset</a:t>
+            </a:r>
+            <a:r>
+              <a:rPr lang="es-ES" dirty="0"/>
+              <a:t> es llamado para inicializar las propiedades de script cuando es por primera vez adjuntado al objeto y también cuando el comando </a:t>
+            </a:r>
+            <a:r>
+              <a:rPr lang="es-ES" dirty="0" err="1"/>
+              <a:t>Reset</a:t>
+            </a:r>
+            <a:r>
+              <a:rPr lang="es-ES" dirty="0"/>
+              <a:t> es utilizado.</a:t>
+            </a:r>
+          </a:p>
+          <a:p>
+            <a:endParaRPr lang="es-ES" dirty="0"/>
+          </a:p>
+          <a:p>
+            <a:r>
+              <a:rPr lang="es-ES" dirty="0" err="1"/>
+              <a:t>Awake</a:t>
+            </a:r>
+            <a:r>
+              <a:rPr lang="es-ES" dirty="0"/>
+              <a:t>: Esta función siempre se llama antes de cualquier función </a:t>
+            </a:r>
+            <a:r>
+              <a:rPr lang="es-ES" dirty="0" err="1"/>
+              <a:t>Start</a:t>
+            </a:r>
+            <a:r>
+              <a:rPr lang="es-ES" dirty="0"/>
+              <a:t> y también justo después de que un </a:t>
+            </a:r>
+            <a:r>
+              <a:rPr lang="es-ES" dirty="0" err="1"/>
+              <a:t>prefab</a:t>
+            </a:r>
+            <a:r>
+              <a:rPr lang="es-ES" dirty="0"/>
+              <a:t> es instanciado.</a:t>
+            </a:r>
+          </a:p>
+          <a:p>
+            <a:endParaRPr lang="es-ES" dirty="0"/>
+          </a:p>
+          <a:p>
+            <a:r>
+              <a:rPr lang="es-ES" dirty="0" err="1"/>
+              <a:t>OnEnable</a:t>
+            </a:r>
+            <a:r>
+              <a:rPr lang="es-ES" dirty="0"/>
+              <a:t>: Esta función es llamada justo después de que el objeto es activado. Esto sucede cuando una instancia de </a:t>
+            </a:r>
+            <a:r>
+              <a:rPr lang="es-ES" dirty="0" err="1"/>
+              <a:t>MonoBehaviour</a:t>
+            </a:r>
+            <a:r>
+              <a:rPr lang="es-ES" dirty="0"/>
+              <a:t> es creada, tal como cuando un nivel es cargado o un </a:t>
+            </a:r>
+            <a:r>
+              <a:rPr lang="es-ES" dirty="0" err="1"/>
+              <a:t>GameObject</a:t>
+            </a:r>
+            <a:r>
+              <a:rPr lang="es-ES" dirty="0"/>
+              <a:t> con un componente script es instanciado.</a:t>
+            </a:r>
+          </a:p>
+          <a:p>
+            <a:r>
+              <a:rPr lang="es-ES" dirty="0" err="1"/>
+              <a:t>Start</a:t>
+            </a:r>
+            <a:r>
+              <a:rPr lang="es-ES" dirty="0"/>
+              <a:t>: </a:t>
+            </a:r>
+            <a:r>
+              <a:rPr lang="es-ES" dirty="0" err="1"/>
+              <a:t>Start</a:t>
+            </a:r>
+            <a:r>
+              <a:rPr lang="es-ES" dirty="0"/>
+              <a:t> es llamado antes de la primera actualización de </a:t>
+            </a:r>
+            <a:r>
+              <a:rPr lang="es-ES" dirty="0" err="1"/>
+              <a:t>frame</a:t>
+            </a:r>
+            <a:r>
+              <a:rPr lang="es-ES" dirty="0"/>
+              <a:t> solo si la instancia del script está activada.</a:t>
+            </a:r>
+          </a:p>
+          <a:p>
+            <a:pPr marL="0" indent="0">
+              <a:buNone/>
+            </a:pPr>
+            <a:endParaRPr lang="es-ES" dirty="0"/>
+          </a:p>
+          <a:p>
+            <a:endParaRPr lang="es-ES" dirty="0"/>
+          </a:p>
+          <a:p>
+            <a:pPr marL="0" indent="0">
+              <a:buNone/>
+            </a:pPr>
+            <a:endParaRPr lang="es-CO" dirty="0"/>
           </a:p>
         </p:txBody>
       </p:sp>
     </p:spTree>
     <p:extLst>
       <p:ext uri="{BB962C8B-B14F-4D97-AF65-F5344CB8AC3E}">
-        <p14:creationId xmlns:p14="http://schemas.microsoft.com/office/powerpoint/2010/main" val="817428127"/>
+        <p14:creationId xmlns:p14="http://schemas.microsoft.com/office/powerpoint/2010/main" val="1906147471"/>
       </p:ext>
     </p:extLst>
   </p:cSld>
@@ -6518,7 +6894,7 @@
           <p:cNvPr id="2" name="Título 1">
             <a:extLst>
               <a:ext uri="{FF2B5EF4-FFF2-40B4-BE49-F238E27FC236}">
-                <a16:creationId xmlns:a16="http://schemas.microsoft.com/office/drawing/2014/main" id="{C7239AB8-1FAD-430E-A0A5-6500C39A0E15}"/>
+                <a16:creationId xmlns:a16="http://schemas.microsoft.com/office/drawing/2014/main" id="{5FA8C9AF-BAA8-4DBE-A085-A7613BC77537}"/>
               </a:ext>
             </a:extLst>
           </p:cNvPr>
@@ -6526,27 +6902,32 @@
             <a:spLocks noGrp="1"/>
           </p:cNvSpPr>
           <p:nvPr>
-            <p:ph type="ctrTitle"/>
-          </p:nvPr>
-        </p:nvSpPr>
-        <p:spPr/>
+            <p:ph type="title"/>
+          </p:nvPr>
+        </p:nvSpPr>
+        <p:spPr>
+          <a:xfrm>
+            <a:off x="768069" y="447188"/>
+            <a:ext cx="10655859" cy="970450"/>
+          </a:xfrm>
+        </p:spPr>
         <p:txBody>
           <a:bodyPr/>
           <a:lstStyle/>
           <a:p>
             <a:r>
               <a:rPr lang="es-CO" dirty="0"/>
-              <a:t>GRACIAS POR SU ATENCIÓN</a:t>
-            </a:r>
-          </a:p>
-        </p:txBody>
-      </p:sp>
-      <p:sp>
-        <p:nvSpPr>
-          <p:cNvPr id="3" name="Subtítulo 2">
+              <a:t>¿CUÁL ES EL CICLO DE VIDA DE UN SCRIPT?</a:t>
+            </a:r>
+          </a:p>
+        </p:txBody>
+      </p:sp>
+      <p:sp>
+        <p:nvSpPr>
+          <p:cNvPr id="3" name="Marcador de contenido 2">
             <a:extLst>
               <a:ext uri="{FF2B5EF4-FFF2-40B4-BE49-F238E27FC236}">
-                <a16:creationId xmlns:a16="http://schemas.microsoft.com/office/drawing/2014/main" id="{23D17BA0-EAF4-423E-9415-724A8F32860B}"/>
+                <a16:creationId xmlns:a16="http://schemas.microsoft.com/office/drawing/2014/main" id="{88885E9D-4F81-4316-8673-85A25378B23A}"/>
               </a:ext>
             </a:extLst>
           </p:cNvPr>
@@ -6554,31 +6935,230 @@
             <a:spLocks noGrp="1"/>
           </p:cNvSpPr>
           <p:nvPr>
-            <p:ph type="subTitle" idx="1"/>
+            <p:ph idx="1"/>
           </p:nvPr>
         </p:nvSpPr>
         <p:spPr>
           <a:xfrm>
-            <a:off x="810000" y="5561253"/>
-            <a:ext cx="10572000" cy="434974"/>
+            <a:off x="590112" y="2687953"/>
+            <a:ext cx="10269276" cy="3636511"/>
           </a:xfrm>
         </p:spPr>
         <p:txBody>
           <a:bodyPr>
-            <a:normAutofit fontScale="77500" lnSpcReduction="20000"/>
+            <a:normAutofit fontScale="85000" lnSpcReduction="20000"/>
           </a:bodyPr>
           <a:lstStyle/>
           <a:p>
             <a:r>
-              <a:rPr lang="es-CO" dirty="0"/>
-              <a:t>Link al repositorio: </a:t>
-            </a:r>
-            <a:r>
-              <a:rPr lang="es-ES" dirty="0">
-                <a:hlinkClick r:id="rId2"/>
-              </a:rPr>
-              <a:t>EmmisFrh12/Taller-2-Scripting: En este repositorio subiremos los ejercicios del taller 2 🗿 (github.com)</a:t>
-            </a:r>
+              <a:rPr lang="es-ES" dirty="0" err="1"/>
+              <a:t>OnApplicationPause</a:t>
+            </a:r>
+            <a:r>
+              <a:rPr lang="es-ES" dirty="0"/>
+              <a:t>: Esto es llamado al final del </a:t>
+            </a:r>
+            <a:r>
+              <a:rPr lang="es-ES" dirty="0" err="1"/>
+              <a:t>frame</a:t>
+            </a:r>
+            <a:r>
+              <a:rPr lang="es-ES" dirty="0"/>
+              <a:t> dónde la pausa es detectada.</a:t>
+            </a:r>
+          </a:p>
+          <a:p>
+            <a:pPr marL="0" indent="0">
+              <a:buNone/>
+            </a:pPr>
+            <a:endParaRPr lang="es-ES" dirty="0"/>
+          </a:p>
+          <a:p>
+            <a:r>
+              <a:rPr lang="es-ES" dirty="0" err="1"/>
+              <a:t>FixedUpdate</a:t>
+            </a:r>
+            <a:r>
+              <a:rPr lang="es-ES" dirty="0"/>
+              <a:t>: Puede ser llamada varias veces por </a:t>
+            </a:r>
+            <a:r>
+              <a:rPr lang="es-ES" dirty="0" err="1"/>
+              <a:t>frame</a:t>
+            </a:r>
+            <a:r>
+              <a:rPr lang="es-ES" dirty="0"/>
+              <a:t>, si la velocidad de </a:t>
+            </a:r>
+            <a:r>
+              <a:rPr lang="es-ES" dirty="0" err="1"/>
+              <a:t>frame</a:t>
+            </a:r>
+            <a:r>
+              <a:rPr lang="es-ES" dirty="0"/>
+              <a:t> es baja y puede no ser llamada entre </a:t>
+            </a:r>
+            <a:r>
+              <a:rPr lang="es-ES" dirty="0" err="1"/>
+              <a:t>frames</a:t>
+            </a:r>
+            <a:r>
+              <a:rPr lang="es-ES" dirty="0"/>
+              <a:t> en absoluto si la velocidad de </a:t>
+            </a:r>
+            <a:r>
+              <a:rPr lang="es-ES" dirty="0" err="1"/>
+              <a:t>frame</a:t>
+            </a:r>
+            <a:r>
+              <a:rPr lang="es-ES" dirty="0"/>
+              <a:t> es alta. Todos los cálculos de física y actualizaciones ocurren inmediatamente después de </a:t>
+            </a:r>
+            <a:r>
+              <a:rPr lang="es-ES" dirty="0" err="1"/>
+              <a:t>FixedUpdate</a:t>
+            </a:r>
+            <a:r>
+              <a:rPr lang="es-ES" dirty="0"/>
+              <a:t>. Esto se debe a que </a:t>
+            </a:r>
+            <a:r>
+              <a:rPr lang="es-ES" dirty="0" err="1"/>
+              <a:t>FixedUpdate</a:t>
+            </a:r>
+            <a:r>
+              <a:rPr lang="es-ES" dirty="0"/>
+              <a:t> en un temporizador fiable, independiente de la velocidad de </a:t>
+            </a:r>
+            <a:r>
+              <a:rPr lang="es-ES" dirty="0" err="1"/>
+              <a:t>frames</a:t>
+            </a:r>
+            <a:r>
+              <a:rPr lang="es-ES" dirty="0"/>
+              <a:t>.</a:t>
+            </a:r>
+          </a:p>
+          <a:p>
+            <a:pPr marL="0" indent="0">
+              <a:buNone/>
+            </a:pPr>
+            <a:endParaRPr lang="es-ES" dirty="0"/>
+          </a:p>
+          <a:p>
+            <a:r>
+              <a:rPr lang="es-ES" dirty="0" err="1"/>
+              <a:t>Update</a:t>
+            </a:r>
+            <a:r>
+              <a:rPr lang="es-ES" dirty="0"/>
+              <a:t>: </a:t>
+            </a:r>
+            <a:r>
+              <a:rPr lang="es-ES" dirty="0" err="1"/>
+              <a:t>Update</a:t>
+            </a:r>
+            <a:r>
+              <a:rPr lang="es-ES" dirty="0"/>
+              <a:t> se llama una vez por </a:t>
+            </a:r>
+            <a:r>
+              <a:rPr lang="es-ES" dirty="0" err="1"/>
+              <a:t>frame</a:t>
+            </a:r>
+            <a:r>
+              <a:rPr lang="es-ES" dirty="0"/>
+              <a:t>. Es la función principal para las actualizaciones de </a:t>
+            </a:r>
+            <a:r>
+              <a:rPr lang="es-ES" dirty="0" err="1"/>
+              <a:t>frames</a:t>
+            </a:r>
+            <a:r>
+              <a:rPr lang="es-ES" dirty="0"/>
+              <a:t>.</a:t>
+            </a:r>
+          </a:p>
+          <a:p>
+            <a:pPr marL="0" indent="0">
+              <a:buNone/>
+            </a:pPr>
+            <a:endParaRPr lang="es-ES" dirty="0"/>
+          </a:p>
+          <a:p>
+            <a:r>
+              <a:rPr lang="es-ES" dirty="0" err="1"/>
+              <a:t>LateUpdate</a:t>
+            </a:r>
+            <a:r>
+              <a:rPr lang="es-ES" dirty="0"/>
+              <a:t>: </a:t>
+            </a:r>
+            <a:r>
+              <a:rPr lang="es-ES" dirty="0" err="1"/>
+              <a:t>LateUpdate</a:t>
+            </a:r>
+            <a:r>
+              <a:rPr lang="es-ES" dirty="0"/>
+              <a:t> es llamada una vez por </a:t>
+            </a:r>
+            <a:r>
+              <a:rPr lang="es-ES" dirty="0" err="1"/>
+              <a:t>frame</a:t>
+            </a:r>
+            <a:r>
+              <a:rPr lang="es-ES" dirty="0"/>
+              <a:t>, después de que </a:t>
+            </a:r>
+            <a:r>
+              <a:rPr lang="es-ES" dirty="0" err="1"/>
+              <a:t>Update</a:t>
+            </a:r>
+            <a:r>
+              <a:rPr lang="es-ES" dirty="0"/>
+              <a:t> haya finalizado. Cualquier cálculo que sea realizado en </a:t>
+            </a:r>
+            <a:r>
+              <a:rPr lang="es-ES" dirty="0" err="1"/>
+              <a:t>Update</a:t>
+            </a:r>
+            <a:r>
+              <a:rPr lang="es-ES" dirty="0"/>
+              <a:t> será completado cuando </a:t>
+            </a:r>
+            <a:r>
+              <a:rPr lang="es-ES" dirty="0" err="1"/>
+              <a:t>LateUpdate</a:t>
+            </a:r>
+            <a:r>
+              <a:rPr lang="es-ES" dirty="0"/>
+              <a:t> comience. Un uso común para </a:t>
+            </a:r>
+            <a:r>
+              <a:rPr lang="es-ES" dirty="0" err="1"/>
+              <a:t>LateUpdate</a:t>
+            </a:r>
+            <a:r>
+              <a:rPr lang="es-ES" dirty="0"/>
+              <a:t> sería una cámara de tercera persona que sigue. </a:t>
+            </a:r>
+          </a:p>
+          <a:p>
+            <a:pPr marL="0" indent="0">
+              <a:buNone/>
+            </a:pPr>
+            <a:r>
+              <a:rPr lang="es-ES" dirty="0"/>
+              <a:t>Estas son solo las funciones más importantes, el orden completo es muy extenso.</a:t>
+            </a:r>
+          </a:p>
+          <a:p>
+            <a:endParaRPr lang="es-ES" dirty="0"/>
+          </a:p>
+          <a:p>
+            <a:pPr marL="0" indent="0">
+              <a:buNone/>
+            </a:pPr>
             <a:endParaRPr lang="es-CO" dirty="0"/>
           </a:p>
         </p:txBody>
@@ -6586,7 +7166,7 @@
     </p:spTree>
     <p:extLst>
       <p:ext uri="{BB962C8B-B14F-4D97-AF65-F5344CB8AC3E}">
-        <p14:creationId xmlns:p14="http://schemas.microsoft.com/office/powerpoint/2010/main" val="1311023220"/>
+        <p14:creationId xmlns:p14="http://schemas.microsoft.com/office/powerpoint/2010/main" val="817428127"/>
       </p:ext>
     </p:extLst>
   </p:cSld>

</xml_diff>

<commit_message>
añadida definicion de event y cambios al codigo
</commit_message>
<xml_diff>
--- a/Presentación/TALLER 2 PRESENTACIÓN.pptx
+++ b/Presentación/TALLER 2 PRESENTACIÓN.pptx
@@ -217,7 +217,7 @@
           <a:effectLst/>
           <a:extLst>
             <a:ext uri="{91240B29-F687-4f45-9708-019B960494DF}">
-              <a14:hiddenLine xmlns:a14="http://schemas.microsoft.com/office/drawing/2010/main" xmlns="" w="9525">
+              <a14:hiddenLine xmlns="" xmlns:a14="http://schemas.microsoft.com/office/drawing/2010/main" w="9525">
                 <a:solidFill>
                   <a:srgbClr val="000000"/>
                 </a:solidFill>
@@ -1739,7 +1739,7 @@
           <a:ln/>
           <a:extLst>
             <a:ext uri="{91240B29-F687-4f45-9708-019B960494DF}">
-              <a14:hiddenLine xmlns:a14="http://schemas.microsoft.com/office/drawing/2010/main" xmlns="" w="9525">
+              <a14:hiddenLine xmlns="" xmlns:a14="http://schemas.microsoft.com/office/drawing/2010/main" w="9525">
                 <a:solidFill>
                   <a:srgbClr val="000000"/>
                 </a:solidFill>
@@ -2014,7 +2014,7 @@
           <a:ln/>
           <a:extLst>
             <a:ext uri="{91240B29-F687-4f45-9708-019B960494DF}">
-              <a14:hiddenLine xmlns:a14="http://schemas.microsoft.com/office/drawing/2010/main" xmlns="" w="9525">
+              <a14:hiddenLine xmlns="" xmlns:a14="http://schemas.microsoft.com/office/drawing/2010/main" w="9525">
                 <a:solidFill>
                   <a:srgbClr val="000000"/>
                 </a:solidFill>
@@ -2297,7 +2297,7 @@
           <a:ln/>
           <a:extLst>
             <a:ext uri="{91240B29-F687-4f45-9708-019B960494DF}">
-              <a14:hiddenLine xmlns:a14="http://schemas.microsoft.com/office/drawing/2010/main" xmlns="" w="9525">
+              <a14:hiddenLine xmlns="" xmlns:a14="http://schemas.microsoft.com/office/drawing/2010/main" w="9525">
                 <a:solidFill>
                   <a:srgbClr val="000000"/>
                 </a:solidFill>
@@ -2923,7 +2923,7 @@
           <a:ln/>
           <a:extLst>
             <a:ext uri="{91240B29-F687-4f45-9708-019B960494DF}">
-              <a14:hiddenLine xmlns:a14="http://schemas.microsoft.com/office/drawing/2010/main" xmlns="" w="9525">
+              <a14:hiddenLine xmlns="" xmlns:a14="http://schemas.microsoft.com/office/drawing/2010/main" w="9525">
                 <a:solidFill>
                   <a:srgbClr val="000000"/>
                 </a:solidFill>
@@ -3262,7 +3262,7 @@
           <a:ln/>
           <a:extLst>
             <a:ext uri="{91240B29-F687-4f45-9708-019B960494DF}">
-              <a14:hiddenLine xmlns:a14="http://schemas.microsoft.com/office/drawing/2010/main" xmlns="" w="9525">
+              <a14:hiddenLine xmlns="" xmlns:a14="http://schemas.microsoft.com/office/drawing/2010/main" w="9525">
                 <a:solidFill>
                   <a:srgbClr val="000000"/>
                 </a:solidFill>
@@ -3739,7 +3739,7 @@
           <a:ln/>
           <a:extLst>
             <a:ext uri="{91240B29-F687-4f45-9708-019B960494DF}">
-              <a14:hiddenLine xmlns:a14="http://schemas.microsoft.com/office/drawing/2010/main" xmlns="" w="9525">
+              <a14:hiddenLine xmlns="" xmlns:a14="http://schemas.microsoft.com/office/drawing/2010/main" w="9525">
                 <a:solidFill>
                   <a:srgbClr val="000000"/>
                 </a:solidFill>
@@ -4168,7 +4168,7 @@
           <a:ln/>
           <a:extLst>
             <a:ext uri="{91240B29-F687-4f45-9708-019B960494DF}">
-              <a14:hiddenLine xmlns:a14="http://schemas.microsoft.com/office/drawing/2010/main" xmlns="" w="9525">
+              <a14:hiddenLine xmlns="" xmlns:a14="http://schemas.microsoft.com/office/drawing/2010/main" w="9525">
                 <a:solidFill>
                   <a:srgbClr val="000000"/>
                 </a:solidFill>
@@ -5875,9 +5875,26 @@
           <a:lstStyle/>
           <a:p>
             <a:r>
-              <a:rPr lang="es-CO" dirty="0"/>
-              <a:t>LOREN IPSUM</a:t>
-            </a:r>
+              <a:rPr lang="es-ES" dirty="0"/>
+              <a:t>Un evento es un mecanismo que permite que un objeto notifique a otros objetos cuando ocurre un determinado suceso.</a:t>
+            </a:r>
+          </a:p>
+          <a:p>
+            <a:endParaRPr lang="es-ES" dirty="0"/>
+          </a:p>
+          <a:p>
+            <a:pPr marL="0" indent="0">
+              <a:buNone/>
+            </a:pPr>
+            <a:r>
+              <a:rPr lang="es-ES" dirty="0"/>
+              <a:t>Un perro ladra =&gt; el gato escucha y corre, un pájaro escucha y se va volando, otro perro escucha y </a:t>
+            </a:r>
+            <a:r>
+              <a:rPr lang="es-ES"/>
+              <a:t>ladra devuelta </a:t>
+            </a:r>
+            <a:endParaRPr lang="es-CO" dirty="0"/>
           </a:p>
         </p:txBody>
       </p:sp>

</xml_diff>

<commit_message>
añadida comparacion con Corgi
</commit_message>
<xml_diff>
--- a/Presentación/TALLER 2 PRESENTACIÓN.pptx
+++ b/Presentación/TALLER 2 PRESENTACIÓN.pptx
@@ -8,14 +8,15 @@
     <p:sldId id="256" r:id="rId2"/>
     <p:sldId id="258" r:id="rId3"/>
     <p:sldId id="259" r:id="rId4"/>
-    <p:sldId id="261" r:id="rId5"/>
-    <p:sldId id="260" r:id="rId6"/>
-    <p:sldId id="257" r:id="rId7"/>
-    <p:sldId id="264" r:id="rId8"/>
-    <p:sldId id="265" r:id="rId9"/>
-    <p:sldId id="262" r:id="rId10"/>
-    <p:sldId id="266" r:id="rId11"/>
-    <p:sldId id="263" r:id="rId12"/>
+    <p:sldId id="267" r:id="rId5"/>
+    <p:sldId id="261" r:id="rId6"/>
+    <p:sldId id="260" r:id="rId7"/>
+    <p:sldId id="257" r:id="rId8"/>
+    <p:sldId id="264" r:id="rId9"/>
+    <p:sldId id="265" r:id="rId10"/>
+    <p:sldId id="262" r:id="rId11"/>
+    <p:sldId id="266" r:id="rId12"/>
+    <p:sldId id="263" r:id="rId13"/>
   </p:sldIdLst>
   <p:sldSz cx="12192000" cy="6858000"/>
   <p:notesSz cx="6858000" cy="9144000"/>
@@ -217,7 +218,7 @@
           <a:effectLst/>
           <a:extLst>
             <a:ext uri="{91240B29-F687-4f45-9708-019B960494DF}">
-              <a14:hiddenLine xmlns="" xmlns:a14="http://schemas.microsoft.com/office/drawing/2010/main" w="9525">
+              <a14:hiddenLine xmlns:a14="http://schemas.microsoft.com/office/drawing/2010/main" xmlns="" w="9525">
                 <a:solidFill>
                   <a:srgbClr val="000000"/>
                 </a:solidFill>
@@ -1739,7 +1740,7 @@
           <a:ln/>
           <a:extLst>
             <a:ext uri="{91240B29-F687-4f45-9708-019B960494DF}">
-              <a14:hiddenLine xmlns="" xmlns:a14="http://schemas.microsoft.com/office/drawing/2010/main" w="9525">
+              <a14:hiddenLine xmlns:a14="http://schemas.microsoft.com/office/drawing/2010/main" xmlns="" w="9525">
                 <a:solidFill>
                   <a:srgbClr val="000000"/>
                 </a:solidFill>
@@ -2014,7 +2015,7 @@
           <a:ln/>
           <a:extLst>
             <a:ext uri="{91240B29-F687-4f45-9708-019B960494DF}">
-              <a14:hiddenLine xmlns="" xmlns:a14="http://schemas.microsoft.com/office/drawing/2010/main" w="9525">
+              <a14:hiddenLine xmlns:a14="http://schemas.microsoft.com/office/drawing/2010/main" xmlns="" w="9525">
                 <a:solidFill>
                   <a:srgbClr val="000000"/>
                 </a:solidFill>
@@ -2297,7 +2298,7 @@
           <a:ln/>
           <a:extLst>
             <a:ext uri="{91240B29-F687-4f45-9708-019B960494DF}">
-              <a14:hiddenLine xmlns="" xmlns:a14="http://schemas.microsoft.com/office/drawing/2010/main" w="9525">
+              <a14:hiddenLine xmlns:a14="http://schemas.microsoft.com/office/drawing/2010/main" xmlns="" w="9525">
                 <a:solidFill>
                   <a:srgbClr val="000000"/>
                 </a:solidFill>
@@ -2923,7 +2924,7 @@
           <a:ln/>
           <a:extLst>
             <a:ext uri="{91240B29-F687-4f45-9708-019B960494DF}">
-              <a14:hiddenLine xmlns="" xmlns:a14="http://schemas.microsoft.com/office/drawing/2010/main" w="9525">
+              <a14:hiddenLine xmlns:a14="http://schemas.microsoft.com/office/drawing/2010/main" xmlns="" w="9525">
                 <a:solidFill>
                   <a:srgbClr val="000000"/>
                 </a:solidFill>
@@ -3262,7 +3263,7 @@
           <a:ln/>
           <a:extLst>
             <a:ext uri="{91240B29-F687-4f45-9708-019B960494DF}">
-              <a14:hiddenLine xmlns="" xmlns:a14="http://schemas.microsoft.com/office/drawing/2010/main" w="9525">
+              <a14:hiddenLine xmlns:a14="http://schemas.microsoft.com/office/drawing/2010/main" xmlns="" w="9525">
                 <a:solidFill>
                   <a:srgbClr val="000000"/>
                 </a:solidFill>
@@ -3739,7 +3740,7 @@
           <a:ln/>
           <a:extLst>
             <a:ext uri="{91240B29-F687-4f45-9708-019B960494DF}">
-              <a14:hiddenLine xmlns="" xmlns:a14="http://schemas.microsoft.com/office/drawing/2010/main" w="9525">
+              <a14:hiddenLine xmlns:a14="http://schemas.microsoft.com/office/drawing/2010/main" xmlns="" w="9525">
                 <a:solidFill>
                   <a:srgbClr val="000000"/>
                 </a:solidFill>
@@ -4168,7 +4169,7 @@
           <a:ln/>
           <a:extLst>
             <a:ext uri="{91240B29-F687-4f45-9708-019B960494DF}">
-              <a14:hiddenLine xmlns="" xmlns:a14="http://schemas.microsoft.com/office/drawing/2010/main" w="9525">
+              <a14:hiddenLine xmlns:a14="http://schemas.microsoft.com/office/drawing/2010/main" xmlns="" w="9525">
                 <a:solidFill>
                   <a:srgbClr val="000000"/>
                 </a:solidFill>
@@ -5497,6 +5498,310 @@
           <p:cNvPr id="2" name="Título 1">
             <a:extLst>
               <a:ext uri="{FF2B5EF4-FFF2-40B4-BE49-F238E27FC236}">
+                <a16:creationId xmlns:a16="http://schemas.microsoft.com/office/drawing/2014/main" id="{5FA8C9AF-BAA8-4DBE-A085-A7613BC77537}"/>
+              </a:ext>
+            </a:extLst>
+          </p:cNvPr>
+          <p:cNvSpPr>
+            <a:spLocks noGrp="1"/>
+          </p:cNvSpPr>
+          <p:nvPr>
+            <p:ph type="title"/>
+          </p:nvPr>
+        </p:nvSpPr>
+        <p:spPr>
+          <a:xfrm>
+            <a:off x="768069" y="447188"/>
+            <a:ext cx="10655859" cy="970450"/>
+          </a:xfrm>
+        </p:spPr>
+        <p:txBody>
+          <a:bodyPr/>
+          <a:lstStyle/>
+          <a:p>
+            <a:r>
+              <a:rPr lang="es-CO" dirty="0"/>
+              <a:t>¿CUÁL ES EL CICLO DE VIDA DE UN SCRIPT?</a:t>
+            </a:r>
+          </a:p>
+        </p:txBody>
+      </p:sp>
+      <p:sp>
+        <p:nvSpPr>
+          <p:cNvPr id="3" name="Marcador de contenido 2">
+            <a:extLst>
+              <a:ext uri="{FF2B5EF4-FFF2-40B4-BE49-F238E27FC236}">
+                <a16:creationId xmlns:a16="http://schemas.microsoft.com/office/drawing/2014/main" id="{88885E9D-4F81-4316-8673-85A25378B23A}"/>
+              </a:ext>
+            </a:extLst>
+          </p:cNvPr>
+          <p:cNvSpPr>
+            <a:spLocks noGrp="1"/>
+          </p:cNvSpPr>
+          <p:nvPr>
+            <p:ph idx="1"/>
+          </p:nvPr>
+        </p:nvSpPr>
+        <p:spPr>
+          <a:xfrm>
+            <a:off x="590112" y="2687953"/>
+            <a:ext cx="10269276" cy="3636511"/>
+          </a:xfrm>
+        </p:spPr>
+        <p:txBody>
+          <a:bodyPr>
+            <a:normAutofit fontScale="85000" lnSpcReduction="20000"/>
+          </a:bodyPr>
+          <a:lstStyle/>
+          <a:p>
+            <a:r>
+              <a:rPr lang="es-ES" dirty="0" err="1"/>
+              <a:t>OnApplicationPause</a:t>
+            </a:r>
+            <a:r>
+              <a:rPr lang="es-ES" dirty="0"/>
+              <a:t>: Esto es llamado al final del </a:t>
+            </a:r>
+            <a:r>
+              <a:rPr lang="es-ES" dirty="0" err="1"/>
+              <a:t>frame</a:t>
+            </a:r>
+            <a:r>
+              <a:rPr lang="es-ES" dirty="0"/>
+              <a:t> dónde la pausa es detectada.</a:t>
+            </a:r>
+          </a:p>
+          <a:p>
+            <a:pPr marL="0" indent="0">
+              <a:buNone/>
+            </a:pPr>
+            <a:endParaRPr lang="es-ES" dirty="0"/>
+          </a:p>
+          <a:p>
+            <a:r>
+              <a:rPr lang="es-ES" dirty="0" err="1"/>
+              <a:t>FixedUpdate</a:t>
+            </a:r>
+            <a:r>
+              <a:rPr lang="es-ES" dirty="0"/>
+              <a:t>: Puede ser llamada varias veces por </a:t>
+            </a:r>
+            <a:r>
+              <a:rPr lang="es-ES" dirty="0" err="1"/>
+              <a:t>frame</a:t>
+            </a:r>
+            <a:r>
+              <a:rPr lang="es-ES" dirty="0"/>
+              <a:t>, si la velocidad de </a:t>
+            </a:r>
+            <a:r>
+              <a:rPr lang="es-ES" dirty="0" err="1"/>
+              <a:t>frame</a:t>
+            </a:r>
+            <a:r>
+              <a:rPr lang="es-ES" dirty="0"/>
+              <a:t> es baja y puede no ser llamada entre </a:t>
+            </a:r>
+            <a:r>
+              <a:rPr lang="es-ES" dirty="0" err="1"/>
+              <a:t>frames</a:t>
+            </a:r>
+            <a:r>
+              <a:rPr lang="es-ES" dirty="0"/>
+              <a:t> en absoluto si la velocidad de </a:t>
+            </a:r>
+            <a:r>
+              <a:rPr lang="es-ES" dirty="0" err="1"/>
+              <a:t>frame</a:t>
+            </a:r>
+            <a:r>
+              <a:rPr lang="es-ES" dirty="0"/>
+              <a:t> es alta. Todos los cálculos de física y actualizaciones ocurren inmediatamente después de </a:t>
+            </a:r>
+            <a:r>
+              <a:rPr lang="es-ES" dirty="0" err="1"/>
+              <a:t>FixedUpdate</a:t>
+            </a:r>
+            <a:r>
+              <a:rPr lang="es-ES" dirty="0"/>
+              <a:t>. Esto se debe a que </a:t>
+            </a:r>
+            <a:r>
+              <a:rPr lang="es-ES" dirty="0" err="1"/>
+              <a:t>FixedUpdate</a:t>
+            </a:r>
+            <a:r>
+              <a:rPr lang="es-ES" dirty="0"/>
+              <a:t> en un temporizador fiable, independiente de la velocidad de </a:t>
+            </a:r>
+            <a:r>
+              <a:rPr lang="es-ES" dirty="0" err="1"/>
+              <a:t>frames</a:t>
+            </a:r>
+            <a:r>
+              <a:rPr lang="es-ES" dirty="0"/>
+              <a:t>.</a:t>
+            </a:r>
+          </a:p>
+          <a:p>
+            <a:pPr marL="0" indent="0">
+              <a:buNone/>
+            </a:pPr>
+            <a:endParaRPr lang="es-ES" dirty="0"/>
+          </a:p>
+          <a:p>
+            <a:r>
+              <a:rPr lang="es-ES" dirty="0" err="1"/>
+              <a:t>Update</a:t>
+            </a:r>
+            <a:r>
+              <a:rPr lang="es-ES" dirty="0"/>
+              <a:t>: </a:t>
+            </a:r>
+            <a:r>
+              <a:rPr lang="es-ES" dirty="0" err="1"/>
+              <a:t>Update</a:t>
+            </a:r>
+            <a:r>
+              <a:rPr lang="es-ES" dirty="0"/>
+              <a:t> se llama una vez por </a:t>
+            </a:r>
+            <a:r>
+              <a:rPr lang="es-ES" dirty="0" err="1"/>
+              <a:t>frame</a:t>
+            </a:r>
+            <a:r>
+              <a:rPr lang="es-ES" dirty="0"/>
+              <a:t>. Es la función principal para las actualizaciones de </a:t>
+            </a:r>
+            <a:r>
+              <a:rPr lang="es-ES" dirty="0" err="1"/>
+              <a:t>frames</a:t>
+            </a:r>
+            <a:r>
+              <a:rPr lang="es-ES" dirty="0"/>
+              <a:t>.</a:t>
+            </a:r>
+          </a:p>
+          <a:p>
+            <a:pPr marL="0" indent="0">
+              <a:buNone/>
+            </a:pPr>
+            <a:endParaRPr lang="es-ES" dirty="0"/>
+          </a:p>
+          <a:p>
+            <a:r>
+              <a:rPr lang="es-ES" dirty="0" err="1"/>
+              <a:t>LateUpdate</a:t>
+            </a:r>
+            <a:r>
+              <a:rPr lang="es-ES" dirty="0"/>
+              <a:t>: </a:t>
+            </a:r>
+            <a:r>
+              <a:rPr lang="es-ES" dirty="0" err="1"/>
+              <a:t>LateUpdate</a:t>
+            </a:r>
+            <a:r>
+              <a:rPr lang="es-ES" dirty="0"/>
+              <a:t> es llamada una vez por </a:t>
+            </a:r>
+            <a:r>
+              <a:rPr lang="es-ES" dirty="0" err="1"/>
+              <a:t>frame</a:t>
+            </a:r>
+            <a:r>
+              <a:rPr lang="es-ES" dirty="0"/>
+              <a:t>, después de que </a:t>
+            </a:r>
+            <a:r>
+              <a:rPr lang="es-ES" dirty="0" err="1"/>
+              <a:t>Update</a:t>
+            </a:r>
+            <a:r>
+              <a:rPr lang="es-ES" dirty="0"/>
+              <a:t> haya finalizado. Cualquier cálculo que sea realizado en </a:t>
+            </a:r>
+            <a:r>
+              <a:rPr lang="es-ES" dirty="0" err="1"/>
+              <a:t>Update</a:t>
+            </a:r>
+            <a:r>
+              <a:rPr lang="es-ES" dirty="0"/>
+              <a:t> será completado cuando </a:t>
+            </a:r>
+            <a:r>
+              <a:rPr lang="es-ES" dirty="0" err="1"/>
+              <a:t>LateUpdate</a:t>
+            </a:r>
+            <a:r>
+              <a:rPr lang="es-ES" dirty="0"/>
+              <a:t> comience. Un uso común para </a:t>
+            </a:r>
+            <a:r>
+              <a:rPr lang="es-ES" dirty="0" err="1"/>
+              <a:t>LateUpdate</a:t>
+            </a:r>
+            <a:r>
+              <a:rPr lang="es-ES" dirty="0"/>
+              <a:t> sería una cámara de tercera persona que sigue. </a:t>
+            </a:r>
+          </a:p>
+          <a:p>
+            <a:pPr marL="0" indent="0">
+              <a:buNone/>
+            </a:pPr>
+            <a:r>
+              <a:rPr lang="es-ES" dirty="0"/>
+              <a:t>Estas son solo las funciones más importantes, el orden completo es muy extenso.</a:t>
+            </a:r>
+          </a:p>
+          <a:p>
+            <a:endParaRPr lang="es-ES" dirty="0"/>
+          </a:p>
+          <a:p>
+            <a:pPr marL="0" indent="0">
+              <a:buNone/>
+            </a:pPr>
+            <a:endParaRPr lang="es-CO" dirty="0"/>
+          </a:p>
+        </p:txBody>
+      </p:sp>
+    </p:spTree>
+    <p:extLst>
+      <p:ext uri="{BB962C8B-B14F-4D97-AF65-F5344CB8AC3E}">
+        <p14:creationId xmlns:p14="http://schemas.microsoft.com/office/powerpoint/2010/main" val="817428127"/>
+      </p:ext>
+    </p:extLst>
+  </p:cSld>
+  <p:clrMapOvr>
+    <a:masterClrMapping/>
+  </p:clrMapOvr>
+</p:sld>
+</file>
+
+<file path=ppt/slides/slide11.xml><?xml version="1.0" encoding="utf-8"?>
+<p:sld xmlns:a="http://schemas.openxmlformats.org/drawingml/2006/main" xmlns:r="http://schemas.openxmlformats.org/officeDocument/2006/relationships" xmlns:p="http://schemas.openxmlformats.org/presentationml/2006/main">
+  <p:cSld>
+    <p:spTree>
+      <p:nvGrpSpPr>
+        <p:cNvPr id="1" name=""/>
+        <p:cNvGrpSpPr/>
+        <p:nvPr/>
+      </p:nvGrpSpPr>
+      <p:grpSpPr>
+        <a:xfrm>
+          <a:off x="0" y="0"/>
+          <a:ext cx="0" cy="0"/>
+          <a:chOff x="0" y="0"/>
+          <a:chExt cx="0" cy="0"/>
+        </a:xfrm>
+      </p:grpSpPr>
+      <p:sp>
+        <p:nvSpPr>
+          <p:cNvPr id="2" name="Título 1">
+            <a:extLst>
+              <a:ext uri="{FF2B5EF4-FFF2-40B4-BE49-F238E27FC236}">
                 <a16:creationId xmlns:a16="http://schemas.microsoft.com/office/drawing/2014/main" id="{5F94284C-2EFD-4684-A8BF-8EBE201F8ED5}"/>
               </a:ext>
             </a:extLst>
@@ -5603,7 +5908,7 @@
 </p:sld>
 </file>
 
-<file path=ppt/slides/slide11.xml><?xml version="1.0" encoding="utf-8"?>
+<file path=ppt/slides/slide12.xml><?xml version="1.0" encoding="utf-8"?>
 <p:sld xmlns:a="http://schemas.openxmlformats.org/drawingml/2006/main" xmlns:r="http://schemas.openxmlformats.org/officeDocument/2006/relationships" xmlns:p="http://schemas.openxmlformats.org/presentationml/2006/main">
   <p:cSld>
     <p:spTree>
@@ -5912,6 +6217,130 @@
 </file>
 
 <file path=ppt/slides/slide4.xml><?xml version="1.0" encoding="utf-8"?>
+<p:sld xmlns:a="http://schemas.openxmlformats.org/drawingml/2006/main" xmlns:r="http://schemas.openxmlformats.org/officeDocument/2006/relationships" xmlns:p="http://schemas.openxmlformats.org/presentationml/2006/main">
+  <p:cSld>
+    <p:spTree>
+      <p:nvGrpSpPr>
+        <p:cNvPr id="1" name=""/>
+        <p:cNvGrpSpPr/>
+        <p:nvPr/>
+      </p:nvGrpSpPr>
+      <p:grpSpPr>
+        <a:xfrm>
+          <a:off x="0" y="0"/>
+          <a:ext cx="0" cy="0"/>
+          <a:chOff x="0" y="0"/>
+          <a:chExt cx="0" cy="0"/>
+        </a:xfrm>
+      </p:grpSpPr>
+      <p:sp>
+        <p:nvSpPr>
+          <p:cNvPr id="2" name="Título 1">
+            <a:extLst>
+              <a:ext uri="{FF2B5EF4-FFF2-40B4-BE49-F238E27FC236}">
+                <a16:creationId xmlns:a16="http://schemas.microsoft.com/office/drawing/2014/main" id="{D1D38327-640E-9BDC-B0F1-8A9D95C7FBA0}"/>
+              </a:ext>
+            </a:extLst>
+          </p:cNvPr>
+          <p:cNvSpPr>
+            <a:spLocks noGrp="1"/>
+          </p:cNvSpPr>
+          <p:nvPr>
+            <p:ph type="title"/>
+          </p:nvPr>
+        </p:nvSpPr>
+        <p:spPr/>
+        <p:txBody>
+          <a:bodyPr/>
+          <a:lstStyle/>
+          <a:p>
+            <a:r>
+              <a:rPr lang="es-ES" dirty="0" err="1"/>
+              <a:t>Comparacion</a:t>
+            </a:r>
+            <a:r>
+              <a:rPr lang="es-ES" dirty="0"/>
+              <a:t> con </a:t>
+            </a:r>
+            <a:r>
+              <a:rPr lang="es-ES" dirty="0" err="1"/>
+              <a:t>Corgi</a:t>
+            </a:r>
+            <a:endParaRPr lang="es-CO" dirty="0"/>
+          </a:p>
+        </p:txBody>
+      </p:sp>
+      <p:sp>
+        <p:nvSpPr>
+          <p:cNvPr id="3" name="Marcador de contenido 2">
+            <a:extLst>
+              <a:ext uri="{FF2B5EF4-FFF2-40B4-BE49-F238E27FC236}">
+                <a16:creationId xmlns:a16="http://schemas.microsoft.com/office/drawing/2014/main" id="{E930B565-641B-CAF1-88B7-B6421BF986AB}"/>
+              </a:ext>
+            </a:extLst>
+          </p:cNvPr>
+          <p:cNvSpPr>
+            <a:spLocks noGrp="1"/>
+          </p:cNvSpPr>
+          <p:nvPr>
+            <p:ph idx="1"/>
+          </p:nvPr>
+        </p:nvSpPr>
+        <p:spPr/>
+        <p:txBody>
+          <a:bodyPr/>
+          <a:lstStyle/>
+          <a:p>
+            <a:r>
+              <a:rPr lang="es-ES" dirty="0"/>
+              <a:t>El concepto de eventos en el </a:t>
+            </a:r>
+            <a:r>
+              <a:rPr lang="es-ES" dirty="0" err="1"/>
+              <a:t>Corgi</a:t>
+            </a:r>
+            <a:r>
+              <a:rPr lang="es-ES" dirty="0"/>
+              <a:t> es el mismo que en c#, un suceso al cual se le pueden suscribir sujetos y se les notifica si el evento ocurre. También usa delegados como los eventos clásicos del c#, la diferencia es que </a:t>
+            </a:r>
+            <a:r>
+              <a:rPr lang="es-ES" dirty="0" err="1"/>
+              <a:t>Corgi</a:t>
+            </a:r>
+            <a:r>
+              <a:rPr lang="es-ES" dirty="0"/>
+              <a:t> tiene simplificado el proceso y con varios eventos predefinidos de </a:t>
+            </a:r>
+            <a:r>
+              <a:rPr lang="es-ES"/>
+              <a:t>sucesos comunes </a:t>
+            </a:r>
+            <a:r>
+              <a:rPr lang="es-ES" dirty="0"/>
+              <a:t>en </a:t>
+            </a:r>
+            <a:r>
+              <a:rPr lang="es-ES"/>
+              <a:t>juegos 2D.</a:t>
+            </a:r>
+            <a:endParaRPr lang="es-CO" dirty="0"/>
+          </a:p>
+        </p:txBody>
+      </p:sp>
+    </p:spTree>
+    <p:extLst>
+      <p:ext uri="{BB962C8B-B14F-4D97-AF65-F5344CB8AC3E}">
+        <p14:creationId xmlns:p14="http://schemas.microsoft.com/office/powerpoint/2010/main" val="108231464"/>
+      </p:ext>
+    </p:extLst>
+  </p:cSld>
+  <p:clrMapOvr>
+    <a:masterClrMapping/>
+  </p:clrMapOvr>
+</p:sld>
+</file>
+
+<file path=ppt/slides/slide5.xml><?xml version="1.0" encoding="utf-8"?>
 <p:sld xmlns:a="http://schemas.openxmlformats.org/drawingml/2006/main" xmlns:r="http://schemas.openxmlformats.org/officeDocument/2006/relationships" xmlns:p="http://schemas.openxmlformats.org/presentationml/2006/main">
   <p:cSld>
     <p:spTree>
@@ -6160,120 +6589,6 @@
 </p:sld>
 </file>
 
-<file path=ppt/slides/slide5.xml><?xml version="1.0" encoding="utf-8"?>
-<p:sld xmlns:a="http://schemas.openxmlformats.org/drawingml/2006/main" xmlns:r="http://schemas.openxmlformats.org/officeDocument/2006/relationships" xmlns:p="http://schemas.openxmlformats.org/presentationml/2006/main">
-  <p:cSld>
-    <p:spTree>
-      <p:nvGrpSpPr>
-        <p:cNvPr id="1" name=""/>
-        <p:cNvGrpSpPr/>
-        <p:nvPr/>
-      </p:nvGrpSpPr>
-      <p:grpSpPr>
-        <a:xfrm>
-          <a:off x="0" y="0"/>
-          <a:ext cx="0" cy="0"/>
-          <a:chOff x="0" y="0"/>
-          <a:chExt cx="0" cy="0"/>
-        </a:xfrm>
-      </p:grpSpPr>
-      <p:sp>
-        <p:nvSpPr>
-          <p:cNvPr id="2" name="Título 1">
-            <a:extLst>
-              <a:ext uri="{FF2B5EF4-FFF2-40B4-BE49-F238E27FC236}">
-                <a16:creationId xmlns:a16="http://schemas.microsoft.com/office/drawing/2014/main" id="{E52965F7-09CC-4B88-B5C8-54957456A5F8}"/>
-              </a:ext>
-            </a:extLst>
-          </p:cNvPr>
-          <p:cNvSpPr>
-            <a:spLocks noGrp="1"/>
-          </p:cNvSpPr>
-          <p:nvPr>
-            <p:ph type="title"/>
-          </p:nvPr>
-        </p:nvSpPr>
-        <p:spPr/>
-        <p:txBody>
-          <a:bodyPr/>
-          <a:lstStyle/>
-          <a:p>
-            <a:r>
-              <a:rPr lang="es-CO" dirty="0"/>
-              <a:t>¿CUÁLES SON SUS PROS Y CONTRAS?</a:t>
-            </a:r>
-          </a:p>
-        </p:txBody>
-      </p:sp>
-      <p:sp>
-        <p:nvSpPr>
-          <p:cNvPr id="3" name="Marcador de contenido 2">
-            <a:extLst>
-              <a:ext uri="{FF2B5EF4-FFF2-40B4-BE49-F238E27FC236}">
-                <a16:creationId xmlns:a16="http://schemas.microsoft.com/office/drawing/2014/main" id="{FE8B99B9-4AE8-40A3-9735-F03A06CDE5B7}"/>
-              </a:ext>
-            </a:extLst>
-          </p:cNvPr>
-          <p:cNvSpPr>
-            <a:spLocks noGrp="1"/>
-          </p:cNvSpPr>
-          <p:nvPr>
-            <p:ph sz="half" idx="1"/>
-          </p:nvPr>
-        </p:nvSpPr>
-        <p:spPr/>
-        <p:txBody>
-          <a:bodyPr/>
-          <a:lstStyle/>
-          <a:p>
-            <a:r>
-              <a:rPr lang="es-CO" dirty="0"/>
-              <a:t>PROS</a:t>
-            </a:r>
-          </a:p>
-        </p:txBody>
-      </p:sp>
-      <p:sp>
-        <p:nvSpPr>
-          <p:cNvPr id="4" name="Marcador de contenido 3">
-            <a:extLst>
-              <a:ext uri="{FF2B5EF4-FFF2-40B4-BE49-F238E27FC236}">
-                <a16:creationId xmlns:a16="http://schemas.microsoft.com/office/drawing/2014/main" id="{F77A1DBD-E315-474B-B466-13F8C6179306}"/>
-              </a:ext>
-            </a:extLst>
-          </p:cNvPr>
-          <p:cNvSpPr>
-            <a:spLocks noGrp="1"/>
-          </p:cNvSpPr>
-          <p:nvPr>
-            <p:ph sz="half" idx="2"/>
-          </p:nvPr>
-        </p:nvSpPr>
-        <p:spPr/>
-        <p:txBody>
-          <a:bodyPr/>
-          <a:lstStyle/>
-          <a:p>
-            <a:r>
-              <a:rPr lang="es-CO" dirty="0"/>
-              <a:t>CONTRAS</a:t>
-            </a:r>
-          </a:p>
-        </p:txBody>
-      </p:sp>
-    </p:spTree>
-    <p:extLst>
-      <p:ext uri="{BB962C8B-B14F-4D97-AF65-F5344CB8AC3E}">
-        <p14:creationId xmlns:p14="http://schemas.microsoft.com/office/powerpoint/2010/main" val="4039265244"/>
-      </p:ext>
-    </p:extLst>
-  </p:cSld>
-  <p:clrMapOvr>
-    <a:masterClrMapping/>
-  </p:clrMapOvr>
-</p:sld>
-</file>
-
 <file path=ppt/slides/slide6.xml><?xml version="1.0" encoding="utf-8"?>
 <p:sld xmlns:a="http://schemas.openxmlformats.org/drawingml/2006/main" xmlns:r="http://schemas.openxmlformats.org/officeDocument/2006/relationships" xmlns:p="http://schemas.openxmlformats.org/presentationml/2006/main">
   <p:cSld>
@@ -6296,6 +6611,120 @@
           <p:cNvPr id="2" name="Título 1">
             <a:extLst>
               <a:ext uri="{FF2B5EF4-FFF2-40B4-BE49-F238E27FC236}">
+                <a16:creationId xmlns:a16="http://schemas.microsoft.com/office/drawing/2014/main" id="{E52965F7-09CC-4B88-B5C8-54957456A5F8}"/>
+              </a:ext>
+            </a:extLst>
+          </p:cNvPr>
+          <p:cNvSpPr>
+            <a:spLocks noGrp="1"/>
+          </p:cNvSpPr>
+          <p:nvPr>
+            <p:ph type="title"/>
+          </p:nvPr>
+        </p:nvSpPr>
+        <p:spPr/>
+        <p:txBody>
+          <a:bodyPr/>
+          <a:lstStyle/>
+          <a:p>
+            <a:r>
+              <a:rPr lang="es-CO" dirty="0"/>
+              <a:t>¿CUÁLES SON SUS PROS Y CONTRAS?</a:t>
+            </a:r>
+          </a:p>
+        </p:txBody>
+      </p:sp>
+      <p:sp>
+        <p:nvSpPr>
+          <p:cNvPr id="3" name="Marcador de contenido 2">
+            <a:extLst>
+              <a:ext uri="{FF2B5EF4-FFF2-40B4-BE49-F238E27FC236}">
+                <a16:creationId xmlns:a16="http://schemas.microsoft.com/office/drawing/2014/main" id="{FE8B99B9-4AE8-40A3-9735-F03A06CDE5B7}"/>
+              </a:ext>
+            </a:extLst>
+          </p:cNvPr>
+          <p:cNvSpPr>
+            <a:spLocks noGrp="1"/>
+          </p:cNvSpPr>
+          <p:nvPr>
+            <p:ph sz="half" idx="1"/>
+          </p:nvPr>
+        </p:nvSpPr>
+        <p:spPr/>
+        <p:txBody>
+          <a:bodyPr/>
+          <a:lstStyle/>
+          <a:p>
+            <a:r>
+              <a:rPr lang="es-CO" dirty="0"/>
+              <a:t>PROS</a:t>
+            </a:r>
+          </a:p>
+        </p:txBody>
+      </p:sp>
+      <p:sp>
+        <p:nvSpPr>
+          <p:cNvPr id="4" name="Marcador de contenido 3">
+            <a:extLst>
+              <a:ext uri="{FF2B5EF4-FFF2-40B4-BE49-F238E27FC236}">
+                <a16:creationId xmlns:a16="http://schemas.microsoft.com/office/drawing/2014/main" id="{F77A1DBD-E315-474B-B466-13F8C6179306}"/>
+              </a:ext>
+            </a:extLst>
+          </p:cNvPr>
+          <p:cNvSpPr>
+            <a:spLocks noGrp="1"/>
+          </p:cNvSpPr>
+          <p:nvPr>
+            <p:ph sz="half" idx="2"/>
+          </p:nvPr>
+        </p:nvSpPr>
+        <p:spPr/>
+        <p:txBody>
+          <a:bodyPr/>
+          <a:lstStyle/>
+          <a:p>
+            <a:r>
+              <a:rPr lang="es-CO" dirty="0"/>
+              <a:t>CONTRAS</a:t>
+            </a:r>
+          </a:p>
+        </p:txBody>
+      </p:sp>
+    </p:spTree>
+    <p:extLst>
+      <p:ext uri="{BB962C8B-B14F-4D97-AF65-F5344CB8AC3E}">
+        <p14:creationId xmlns:p14="http://schemas.microsoft.com/office/powerpoint/2010/main" val="4039265244"/>
+      </p:ext>
+    </p:extLst>
+  </p:cSld>
+  <p:clrMapOvr>
+    <a:masterClrMapping/>
+  </p:clrMapOvr>
+</p:sld>
+</file>
+
+<file path=ppt/slides/slide7.xml><?xml version="1.0" encoding="utf-8"?>
+<p:sld xmlns:a="http://schemas.openxmlformats.org/drawingml/2006/main" xmlns:r="http://schemas.openxmlformats.org/officeDocument/2006/relationships" xmlns:p="http://schemas.openxmlformats.org/presentationml/2006/main">
+  <p:cSld>
+    <p:spTree>
+      <p:nvGrpSpPr>
+        <p:cNvPr id="1" name=""/>
+        <p:cNvGrpSpPr/>
+        <p:nvPr/>
+      </p:nvGrpSpPr>
+      <p:grpSpPr>
+        <a:xfrm>
+          <a:off x="0" y="0"/>
+          <a:ext cx="0" cy="0"/>
+          <a:chOff x="0" y="0"/>
+          <a:chExt cx="0" cy="0"/>
+        </a:xfrm>
+      </p:grpSpPr>
+      <p:sp>
+        <p:nvSpPr>
+          <p:cNvPr id="2" name="Título 1">
+            <a:extLst>
+              <a:ext uri="{FF2B5EF4-FFF2-40B4-BE49-F238E27FC236}">
                 <a16:creationId xmlns:a16="http://schemas.microsoft.com/office/drawing/2014/main" id="{06A1A8E4-5D12-4E22-80CA-B60B632DC75F}"/>
               </a:ext>
             </a:extLst>
@@ -6438,7 +6867,7 @@
 </p:sld>
 </file>
 
-<file path=ppt/slides/slide7.xml><?xml version="1.0" encoding="utf-8"?>
+<file path=ppt/slides/slide8.xml><?xml version="1.0" encoding="utf-8"?>
 <p:sld xmlns:a="http://schemas.openxmlformats.org/drawingml/2006/main" xmlns:r="http://schemas.openxmlformats.org/officeDocument/2006/relationships" xmlns:p="http://schemas.openxmlformats.org/presentationml/2006/main">
   <p:cSld>
     <p:spTree>
@@ -6652,243 +7081,6 @@
 </p:sld>
 </file>
 
-<file path=ppt/slides/slide8.xml><?xml version="1.0" encoding="utf-8"?>
-<p:sld xmlns:a="http://schemas.openxmlformats.org/drawingml/2006/main" xmlns:r="http://schemas.openxmlformats.org/officeDocument/2006/relationships" xmlns:p="http://schemas.openxmlformats.org/presentationml/2006/main">
-  <p:cSld>
-    <p:spTree>
-      <p:nvGrpSpPr>
-        <p:cNvPr id="1" name=""/>
-        <p:cNvGrpSpPr/>
-        <p:nvPr/>
-      </p:nvGrpSpPr>
-      <p:grpSpPr>
-        <a:xfrm>
-          <a:off x="0" y="0"/>
-          <a:ext cx="0" cy="0"/>
-          <a:chOff x="0" y="0"/>
-          <a:chExt cx="0" cy="0"/>
-        </a:xfrm>
-      </p:grpSpPr>
-      <p:sp>
-        <p:nvSpPr>
-          <p:cNvPr id="2" name="Título 1">
-            <a:extLst>
-              <a:ext uri="{FF2B5EF4-FFF2-40B4-BE49-F238E27FC236}">
-                <a16:creationId xmlns:a16="http://schemas.microsoft.com/office/drawing/2014/main" id="{5FA8C9AF-BAA8-4DBE-A085-A7613BC77537}"/>
-              </a:ext>
-            </a:extLst>
-          </p:cNvPr>
-          <p:cNvSpPr>
-            <a:spLocks noGrp="1"/>
-          </p:cNvSpPr>
-          <p:nvPr>
-            <p:ph type="title"/>
-          </p:nvPr>
-        </p:nvSpPr>
-        <p:spPr>
-          <a:xfrm>
-            <a:off x="768069" y="447188"/>
-            <a:ext cx="10655859" cy="970450"/>
-          </a:xfrm>
-        </p:spPr>
-        <p:txBody>
-          <a:bodyPr/>
-          <a:lstStyle/>
-          <a:p>
-            <a:r>
-              <a:rPr lang="es-CO" dirty="0"/>
-              <a:t>¿CUÁL ES EL CICLO DE VIDA DE UN SCRIPT?</a:t>
-            </a:r>
-          </a:p>
-        </p:txBody>
-      </p:sp>
-      <p:sp>
-        <p:nvSpPr>
-          <p:cNvPr id="3" name="Marcador de contenido 2">
-            <a:extLst>
-              <a:ext uri="{FF2B5EF4-FFF2-40B4-BE49-F238E27FC236}">
-                <a16:creationId xmlns:a16="http://schemas.microsoft.com/office/drawing/2014/main" id="{88885E9D-4F81-4316-8673-85A25378B23A}"/>
-              </a:ext>
-            </a:extLst>
-          </p:cNvPr>
-          <p:cNvSpPr>
-            <a:spLocks noGrp="1"/>
-          </p:cNvSpPr>
-          <p:nvPr>
-            <p:ph idx="1"/>
-          </p:nvPr>
-        </p:nvSpPr>
-        <p:spPr>
-          <a:xfrm>
-            <a:off x="607046" y="2774301"/>
-            <a:ext cx="10269276" cy="3636511"/>
-          </a:xfrm>
-        </p:spPr>
-        <p:txBody>
-          <a:bodyPr>
-            <a:normAutofit fontScale="85000" lnSpcReduction="20000"/>
-          </a:bodyPr>
-          <a:lstStyle/>
-          <a:p>
-            <a:pPr marL="0" indent="0">
-              <a:buNone/>
-            </a:pPr>
-            <a:r>
-              <a:rPr lang="es-ES" dirty="0"/>
-              <a:t>El ciclo de vida de un script en </a:t>
-            </a:r>
-            <a:r>
-              <a:rPr lang="es-ES" dirty="0" err="1"/>
-              <a:t>unity</a:t>
-            </a:r>
-            <a:r>
-              <a:rPr lang="es-ES" dirty="0"/>
-              <a:t> se refiere a el orden en el que se ejecutan las funciones del script. Orden:</a:t>
-            </a:r>
-          </a:p>
-          <a:p>
-            <a:endParaRPr lang="es-ES" dirty="0"/>
-          </a:p>
-          <a:p>
-            <a:r>
-              <a:rPr lang="es-ES" dirty="0" err="1"/>
-              <a:t>Reset</a:t>
-            </a:r>
-            <a:r>
-              <a:rPr lang="es-ES" dirty="0"/>
-              <a:t>: El </a:t>
-            </a:r>
-            <a:r>
-              <a:rPr lang="es-ES" dirty="0" err="1"/>
-              <a:t>reset</a:t>
-            </a:r>
-            <a:r>
-              <a:rPr lang="es-ES" dirty="0"/>
-              <a:t> es llamado para inicializar las propiedades de script cuando es por primera vez adjuntado al objeto y también cuando el comando </a:t>
-            </a:r>
-            <a:r>
-              <a:rPr lang="es-ES" dirty="0" err="1"/>
-              <a:t>Reset</a:t>
-            </a:r>
-            <a:r>
-              <a:rPr lang="es-ES" dirty="0"/>
-              <a:t> es utilizado.</a:t>
-            </a:r>
-          </a:p>
-          <a:p>
-            <a:endParaRPr lang="es-ES" dirty="0"/>
-          </a:p>
-          <a:p>
-            <a:r>
-              <a:rPr lang="es-ES" dirty="0" err="1"/>
-              <a:t>Awake</a:t>
-            </a:r>
-            <a:r>
-              <a:rPr lang="es-ES" dirty="0"/>
-              <a:t>: Esta función siempre se llama antes de cualquier función </a:t>
-            </a:r>
-            <a:r>
-              <a:rPr lang="es-ES" dirty="0" err="1"/>
-              <a:t>Start</a:t>
-            </a:r>
-            <a:r>
-              <a:rPr lang="es-ES" dirty="0"/>
-              <a:t> y también justo después de que un </a:t>
-            </a:r>
-            <a:r>
-              <a:rPr lang="es-ES" dirty="0" err="1"/>
-              <a:t>prefab</a:t>
-            </a:r>
-            <a:r>
-              <a:rPr lang="es-ES" dirty="0"/>
-              <a:t> es instanciado.</a:t>
-            </a:r>
-          </a:p>
-          <a:p>
-            <a:endParaRPr lang="es-ES" dirty="0"/>
-          </a:p>
-          <a:p>
-            <a:r>
-              <a:rPr lang="es-ES" dirty="0" err="1"/>
-              <a:t>OnEnable</a:t>
-            </a:r>
-            <a:r>
-              <a:rPr lang="es-ES" dirty="0"/>
-              <a:t>: Esta función es llamada justo después de que el objeto es activado. Esto sucede cuando una instancia de </a:t>
-            </a:r>
-            <a:r>
-              <a:rPr lang="es-ES" dirty="0" err="1"/>
-              <a:t>MonoBehaviour</a:t>
-            </a:r>
-            <a:r>
-              <a:rPr lang="es-ES" dirty="0"/>
-              <a:t> es creada, tal como cuando un nivel es cargado o un </a:t>
-            </a:r>
-            <a:r>
-              <a:rPr lang="es-ES" dirty="0" err="1"/>
-              <a:t>GameObject</a:t>
-            </a:r>
-            <a:r>
-              <a:rPr lang="es-ES" dirty="0"/>
-              <a:t> con un componente script es instanciado.</a:t>
-            </a:r>
-          </a:p>
-          <a:p>
-            <a:r>
-              <a:rPr lang="es-ES" dirty="0" err="1"/>
-              <a:t>Start</a:t>
-            </a:r>
-            <a:r>
-              <a:rPr lang="es-ES" dirty="0"/>
-              <a:t>: </a:t>
-            </a:r>
-            <a:r>
-              <a:rPr lang="es-ES" dirty="0" err="1"/>
-              <a:t>Start</a:t>
-            </a:r>
-            <a:r>
-              <a:rPr lang="es-ES" dirty="0"/>
-              <a:t> es llamado antes de la primera actualización de </a:t>
-            </a:r>
-            <a:r>
-              <a:rPr lang="es-ES" dirty="0" err="1"/>
-              <a:t>frame</a:t>
-            </a:r>
-            <a:r>
-              <a:rPr lang="es-ES" dirty="0"/>
-              <a:t> solo si la instancia del script está activada.</a:t>
-            </a:r>
-          </a:p>
-          <a:p>
-            <a:pPr marL="0" indent="0">
-              <a:buNone/>
-            </a:pPr>
-            <a:endParaRPr lang="es-ES" dirty="0"/>
-          </a:p>
-          <a:p>
-            <a:endParaRPr lang="es-ES" dirty="0"/>
-          </a:p>
-          <a:p>
-            <a:pPr marL="0" indent="0">
-              <a:buNone/>
-            </a:pPr>
-            <a:endParaRPr lang="es-CO" dirty="0"/>
-          </a:p>
-        </p:txBody>
-      </p:sp>
-    </p:spTree>
-    <p:extLst>
-      <p:ext uri="{BB962C8B-B14F-4D97-AF65-F5344CB8AC3E}">
-        <p14:creationId xmlns:p14="http://schemas.microsoft.com/office/powerpoint/2010/main" val="1906147471"/>
-      </p:ext>
-    </p:extLst>
-  </p:cSld>
-  <p:clrMapOvr>
-    <a:masterClrMapping/>
-  </p:clrMapOvr>
-</p:sld>
-</file>
-
 <file path=ppt/slides/slide9.xml><?xml version="1.0" encoding="utf-8"?>
 <p:sld xmlns:a="http://schemas.openxmlformats.org/drawingml/2006/main" xmlns:r="http://schemas.openxmlformats.org/officeDocument/2006/relationships" xmlns:p="http://schemas.openxmlformats.org/presentationml/2006/main">
   <p:cSld>
@@ -6957,7 +7149,7 @@
         </p:nvSpPr>
         <p:spPr>
           <a:xfrm>
-            <a:off x="590112" y="2687953"/>
+            <a:off x="607046" y="2774301"/>
             <a:ext cx="10269276" cy="3636511"/>
           </a:xfrm>
         </p:spPr>
@@ -6967,13 +7159,125 @@
           </a:bodyPr>
           <a:lstStyle/>
           <a:p>
+            <a:pPr marL="0" indent="0">
+              <a:buNone/>
+            </a:pPr>
+            <a:r>
+              <a:rPr lang="es-ES" dirty="0"/>
+              <a:t>El ciclo de vida de un script en </a:t>
+            </a:r>
             <a:r>
               <a:rPr lang="es-ES" dirty="0" err="1"/>
-              <a:t>OnApplicationPause</a:t>
+              <a:t>unity</a:t>
             </a:r>
             <a:r>
               <a:rPr lang="es-ES" dirty="0"/>
-              <a:t>: Esto es llamado al final del </a:t>
+              <a:t> se refiere a el orden en el que se ejecutan las funciones del script. Orden:</a:t>
+            </a:r>
+          </a:p>
+          <a:p>
+            <a:endParaRPr lang="es-ES" dirty="0"/>
+          </a:p>
+          <a:p>
+            <a:r>
+              <a:rPr lang="es-ES" dirty="0" err="1"/>
+              <a:t>Reset</a:t>
+            </a:r>
+            <a:r>
+              <a:rPr lang="es-ES" dirty="0"/>
+              <a:t>: El </a:t>
+            </a:r>
+            <a:r>
+              <a:rPr lang="es-ES" dirty="0" err="1"/>
+              <a:t>reset</a:t>
+            </a:r>
+            <a:r>
+              <a:rPr lang="es-ES" dirty="0"/>
+              <a:t> es llamado para inicializar las propiedades de script cuando es por primera vez adjuntado al objeto y también cuando el comando </a:t>
+            </a:r>
+            <a:r>
+              <a:rPr lang="es-ES" dirty="0" err="1"/>
+              <a:t>Reset</a:t>
+            </a:r>
+            <a:r>
+              <a:rPr lang="es-ES" dirty="0"/>
+              <a:t> es utilizado.</a:t>
+            </a:r>
+          </a:p>
+          <a:p>
+            <a:endParaRPr lang="es-ES" dirty="0"/>
+          </a:p>
+          <a:p>
+            <a:r>
+              <a:rPr lang="es-ES" dirty="0" err="1"/>
+              <a:t>Awake</a:t>
+            </a:r>
+            <a:r>
+              <a:rPr lang="es-ES" dirty="0"/>
+              <a:t>: Esta función siempre se llama antes de cualquier función </a:t>
+            </a:r>
+            <a:r>
+              <a:rPr lang="es-ES" dirty="0" err="1"/>
+              <a:t>Start</a:t>
+            </a:r>
+            <a:r>
+              <a:rPr lang="es-ES" dirty="0"/>
+              <a:t> y también justo después de que un </a:t>
+            </a:r>
+            <a:r>
+              <a:rPr lang="es-ES" dirty="0" err="1"/>
+              <a:t>prefab</a:t>
+            </a:r>
+            <a:r>
+              <a:rPr lang="es-ES" dirty="0"/>
+              <a:t> es instanciado.</a:t>
+            </a:r>
+          </a:p>
+          <a:p>
+            <a:endParaRPr lang="es-ES" dirty="0"/>
+          </a:p>
+          <a:p>
+            <a:r>
+              <a:rPr lang="es-ES" dirty="0" err="1"/>
+              <a:t>OnEnable</a:t>
+            </a:r>
+            <a:r>
+              <a:rPr lang="es-ES" dirty="0"/>
+              <a:t>: Esta función es llamada justo después de que el objeto es activado. Esto sucede cuando una instancia de </a:t>
+            </a:r>
+            <a:r>
+              <a:rPr lang="es-ES" dirty="0" err="1"/>
+              <a:t>MonoBehaviour</a:t>
+            </a:r>
+            <a:r>
+              <a:rPr lang="es-ES" dirty="0"/>
+              <a:t> es creada, tal como cuando un nivel es cargado o un </a:t>
+            </a:r>
+            <a:r>
+              <a:rPr lang="es-ES" dirty="0" err="1"/>
+              <a:t>GameObject</a:t>
+            </a:r>
+            <a:r>
+              <a:rPr lang="es-ES" dirty="0"/>
+              <a:t> con un componente script es instanciado.</a:t>
+            </a:r>
+          </a:p>
+          <a:p>
+            <a:r>
+              <a:rPr lang="es-ES" dirty="0" err="1"/>
+              <a:t>Start</a:t>
+            </a:r>
+            <a:r>
+              <a:rPr lang="es-ES" dirty="0"/>
+              <a:t>: </a:t>
+            </a:r>
+            <a:r>
+              <a:rPr lang="es-ES" dirty="0" err="1"/>
+              <a:t>Start</a:t>
+            </a:r>
+            <a:r>
+              <a:rPr lang="es-ES" dirty="0"/>
+              <a:t> es llamado antes de la primera actualización de </a:t>
             </a:r>
             <a:r>
               <a:rPr lang="es-ES" dirty="0" err="1"/>
@@ -6981,7 +7285,7 @@
             </a:r>
             <a:r>
               <a:rPr lang="es-ES" dirty="0"/>
-              <a:t> dónde la pausa es detectada.</a:t>
+              <a:t> solo si la instancia del script está activada.</a:t>
             </a:r>
           </a:p>
           <a:p>
@@ -6989,185 +7293,6 @@
               <a:buNone/>
             </a:pPr>
             <a:endParaRPr lang="es-ES" dirty="0"/>
-          </a:p>
-          <a:p>
-            <a:r>
-              <a:rPr lang="es-ES" dirty="0" err="1"/>
-              <a:t>FixedUpdate</a:t>
-            </a:r>
-            <a:r>
-              <a:rPr lang="es-ES" dirty="0"/>
-              <a:t>: Puede ser llamada varias veces por </a:t>
-            </a:r>
-            <a:r>
-              <a:rPr lang="es-ES" dirty="0" err="1"/>
-              <a:t>frame</a:t>
-            </a:r>
-            <a:r>
-              <a:rPr lang="es-ES" dirty="0"/>
-              <a:t>, si la velocidad de </a:t>
-            </a:r>
-            <a:r>
-              <a:rPr lang="es-ES" dirty="0" err="1"/>
-              <a:t>frame</a:t>
-            </a:r>
-            <a:r>
-              <a:rPr lang="es-ES" dirty="0"/>
-              <a:t> es baja y puede no ser llamada entre </a:t>
-            </a:r>
-            <a:r>
-              <a:rPr lang="es-ES" dirty="0" err="1"/>
-              <a:t>frames</a:t>
-            </a:r>
-            <a:r>
-              <a:rPr lang="es-ES" dirty="0"/>
-              <a:t> en absoluto si la velocidad de </a:t>
-            </a:r>
-            <a:r>
-              <a:rPr lang="es-ES" dirty="0" err="1"/>
-              <a:t>frame</a:t>
-            </a:r>
-            <a:r>
-              <a:rPr lang="es-ES" dirty="0"/>
-              <a:t> es alta. Todos los cálculos de física y actualizaciones ocurren inmediatamente después de </a:t>
-            </a:r>
-            <a:r>
-              <a:rPr lang="es-ES" dirty="0" err="1"/>
-              <a:t>FixedUpdate</a:t>
-            </a:r>
-            <a:r>
-              <a:rPr lang="es-ES" dirty="0"/>
-              <a:t>. Esto se debe a que </a:t>
-            </a:r>
-            <a:r>
-              <a:rPr lang="es-ES" dirty="0" err="1"/>
-              <a:t>FixedUpdate</a:t>
-            </a:r>
-            <a:r>
-              <a:rPr lang="es-ES" dirty="0"/>
-              <a:t> en un temporizador fiable, independiente de la velocidad de </a:t>
-            </a:r>
-            <a:r>
-              <a:rPr lang="es-ES" dirty="0" err="1"/>
-              <a:t>frames</a:t>
-            </a:r>
-            <a:r>
-              <a:rPr lang="es-ES" dirty="0"/>
-              <a:t>.</a:t>
-            </a:r>
-          </a:p>
-          <a:p>
-            <a:pPr marL="0" indent="0">
-              <a:buNone/>
-            </a:pPr>
-            <a:endParaRPr lang="es-ES" dirty="0"/>
-          </a:p>
-          <a:p>
-            <a:r>
-              <a:rPr lang="es-ES" dirty="0" err="1"/>
-              <a:t>Update</a:t>
-            </a:r>
-            <a:r>
-              <a:rPr lang="es-ES" dirty="0"/>
-              <a:t>: </a:t>
-            </a:r>
-            <a:r>
-              <a:rPr lang="es-ES" dirty="0" err="1"/>
-              <a:t>Update</a:t>
-            </a:r>
-            <a:r>
-              <a:rPr lang="es-ES" dirty="0"/>
-              <a:t> se llama una vez por </a:t>
-            </a:r>
-            <a:r>
-              <a:rPr lang="es-ES" dirty="0" err="1"/>
-              <a:t>frame</a:t>
-            </a:r>
-            <a:r>
-              <a:rPr lang="es-ES" dirty="0"/>
-              <a:t>. Es la función principal para las actualizaciones de </a:t>
-            </a:r>
-            <a:r>
-              <a:rPr lang="es-ES" dirty="0" err="1"/>
-              <a:t>frames</a:t>
-            </a:r>
-            <a:r>
-              <a:rPr lang="es-ES" dirty="0"/>
-              <a:t>.</a:t>
-            </a:r>
-          </a:p>
-          <a:p>
-            <a:pPr marL="0" indent="0">
-              <a:buNone/>
-            </a:pPr>
-            <a:endParaRPr lang="es-ES" dirty="0"/>
-          </a:p>
-          <a:p>
-            <a:r>
-              <a:rPr lang="es-ES" dirty="0" err="1"/>
-              <a:t>LateUpdate</a:t>
-            </a:r>
-            <a:r>
-              <a:rPr lang="es-ES" dirty="0"/>
-              <a:t>: </a:t>
-            </a:r>
-            <a:r>
-              <a:rPr lang="es-ES" dirty="0" err="1"/>
-              <a:t>LateUpdate</a:t>
-            </a:r>
-            <a:r>
-              <a:rPr lang="es-ES" dirty="0"/>
-              <a:t> es llamada una vez por </a:t>
-            </a:r>
-            <a:r>
-              <a:rPr lang="es-ES" dirty="0" err="1"/>
-              <a:t>frame</a:t>
-            </a:r>
-            <a:r>
-              <a:rPr lang="es-ES" dirty="0"/>
-              <a:t>, después de que </a:t>
-            </a:r>
-            <a:r>
-              <a:rPr lang="es-ES" dirty="0" err="1"/>
-              <a:t>Update</a:t>
-            </a:r>
-            <a:r>
-              <a:rPr lang="es-ES" dirty="0"/>
-              <a:t> haya finalizado. Cualquier cálculo que sea realizado en </a:t>
-            </a:r>
-            <a:r>
-              <a:rPr lang="es-ES" dirty="0" err="1"/>
-              <a:t>Update</a:t>
-            </a:r>
-            <a:r>
-              <a:rPr lang="es-ES" dirty="0"/>
-              <a:t> será completado cuando </a:t>
-            </a:r>
-            <a:r>
-              <a:rPr lang="es-ES" dirty="0" err="1"/>
-              <a:t>LateUpdate</a:t>
-            </a:r>
-            <a:r>
-              <a:rPr lang="es-ES" dirty="0"/>
-              <a:t> comience. Un uso común para </a:t>
-            </a:r>
-            <a:r>
-              <a:rPr lang="es-ES" dirty="0" err="1"/>
-              <a:t>LateUpdate</a:t>
-            </a:r>
-            <a:r>
-              <a:rPr lang="es-ES" dirty="0"/>
-              <a:t> sería una cámara de tercera persona que sigue. </a:t>
-            </a:r>
-          </a:p>
-          <a:p>
-            <a:pPr marL="0" indent="0">
-              <a:buNone/>
-            </a:pPr>
-            <a:r>
-              <a:rPr lang="es-ES" dirty="0"/>
-              <a:t>Estas son solo las funciones más importantes, el orden completo es muy extenso.</a:t>
-            </a:r>
           </a:p>
           <a:p>
             <a:endParaRPr lang="es-ES" dirty="0"/>
@@ -7183,7 +7308,7 @@
     </p:spTree>
     <p:extLst>
       <p:ext uri="{BB962C8B-B14F-4D97-AF65-F5344CB8AC3E}">
-        <p14:creationId xmlns:p14="http://schemas.microsoft.com/office/powerpoint/2010/main" val="817428127"/>
+        <p14:creationId xmlns:p14="http://schemas.microsoft.com/office/powerpoint/2010/main" val="1906147471"/>
       </p:ext>
     </p:extLst>
   </p:cSld>

</xml_diff>

<commit_message>
Actualización Nueva Power Point
</commit_message>
<xml_diff>
--- a/Presentación/TALLER 2 PRESENTACIÓN.pptx
+++ b/Presentación/TALLER 2 PRESENTACIÓN.pptx
@@ -7,15 +7,16 @@
   <p:sldIdLst>
     <p:sldId id="256" r:id="rId2"/>
     <p:sldId id="258" r:id="rId3"/>
-    <p:sldId id="259" r:id="rId4"/>
-    <p:sldId id="261" r:id="rId5"/>
-    <p:sldId id="260" r:id="rId6"/>
-    <p:sldId id="257" r:id="rId7"/>
-    <p:sldId id="264" r:id="rId8"/>
-    <p:sldId id="265" r:id="rId9"/>
-    <p:sldId id="262" r:id="rId10"/>
-    <p:sldId id="266" r:id="rId11"/>
-    <p:sldId id="263" r:id="rId12"/>
+    <p:sldId id="267" r:id="rId4"/>
+    <p:sldId id="259" r:id="rId5"/>
+    <p:sldId id="261" r:id="rId6"/>
+    <p:sldId id="260" r:id="rId7"/>
+    <p:sldId id="257" r:id="rId8"/>
+    <p:sldId id="264" r:id="rId9"/>
+    <p:sldId id="265" r:id="rId10"/>
+    <p:sldId id="262" r:id="rId11"/>
+    <p:sldId id="266" r:id="rId12"/>
+    <p:sldId id="263" r:id="rId13"/>
   </p:sldIdLst>
   <p:sldSz cx="12192000" cy="6858000"/>
   <p:notesSz cx="6858000" cy="9144000"/>
@@ -217,7 +218,7 @@
           <a:effectLst/>
           <a:extLst>
             <a:ext uri="{91240B29-F687-4f45-9708-019B960494DF}">
-              <a14:hiddenLine xmlns:a14="http://schemas.microsoft.com/office/drawing/2010/main" xmlns="" w="9525">
+              <a14:hiddenLine xmlns="" xmlns:a14="http://schemas.microsoft.com/office/drawing/2010/main" w="9525">
                 <a:solidFill>
                   <a:srgbClr val="000000"/>
                 </a:solidFill>
@@ -1739,7 +1740,7 @@
           <a:ln/>
           <a:extLst>
             <a:ext uri="{91240B29-F687-4f45-9708-019B960494DF}">
-              <a14:hiddenLine xmlns:a14="http://schemas.microsoft.com/office/drawing/2010/main" xmlns="" w="9525">
+              <a14:hiddenLine xmlns="" xmlns:a14="http://schemas.microsoft.com/office/drawing/2010/main" w="9525">
                 <a:solidFill>
                   <a:srgbClr val="000000"/>
                 </a:solidFill>
@@ -2014,7 +2015,7 @@
           <a:ln/>
           <a:extLst>
             <a:ext uri="{91240B29-F687-4f45-9708-019B960494DF}">
-              <a14:hiddenLine xmlns:a14="http://schemas.microsoft.com/office/drawing/2010/main" xmlns="" w="9525">
+              <a14:hiddenLine xmlns="" xmlns:a14="http://schemas.microsoft.com/office/drawing/2010/main" w="9525">
                 <a:solidFill>
                   <a:srgbClr val="000000"/>
                 </a:solidFill>
@@ -2297,7 +2298,7 @@
           <a:ln/>
           <a:extLst>
             <a:ext uri="{91240B29-F687-4f45-9708-019B960494DF}">
-              <a14:hiddenLine xmlns:a14="http://schemas.microsoft.com/office/drawing/2010/main" xmlns="" w="9525">
+              <a14:hiddenLine xmlns="" xmlns:a14="http://schemas.microsoft.com/office/drawing/2010/main" w="9525">
                 <a:solidFill>
                   <a:srgbClr val="000000"/>
                 </a:solidFill>
@@ -2923,7 +2924,7 @@
           <a:ln/>
           <a:extLst>
             <a:ext uri="{91240B29-F687-4f45-9708-019B960494DF}">
-              <a14:hiddenLine xmlns:a14="http://schemas.microsoft.com/office/drawing/2010/main" xmlns="" w="9525">
+              <a14:hiddenLine xmlns="" xmlns:a14="http://schemas.microsoft.com/office/drawing/2010/main" w="9525">
                 <a:solidFill>
                   <a:srgbClr val="000000"/>
                 </a:solidFill>
@@ -3262,7 +3263,7 @@
           <a:ln/>
           <a:extLst>
             <a:ext uri="{91240B29-F687-4f45-9708-019B960494DF}">
-              <a14:hiddenLine xmlns:a14="http://schemas.microsoft.com/office/drawing/2010/main" xmlns="" w="9525">
+              <a14:hiddenLine xmlns="" xmlns:a14="http://schemas.microsoft.com/office/drawing/2010/main" w="9525">
                 <a:solidFill>
                   <a:srgbClr val="000000"/>
                 </a:solidFill>
@@ -3739,7 +3740,7 @@
           <a:ln/>
           <a:extLst>
             <a:ext uri="{91240B29-F687-4f45-9708-019B960494DF}">
-              <a14:hiddenLine xmlns:a14="http://schemas.microsoft.com/office/drawing/2010/main" xmlns="" w="9525">
+              <a14:hiddenLine xmlns="" xmlns:a14="http://schemas.microsoft.com/office/drawing/2010/main" w="9525">
                 <a:solidFill>
                   <a:srgbClr val="000000"/>
                 </a:solidFill>
@@ -4168,7 +4169,7 @@
           <a:ln/>
           <a:extLst>
             <a:ext uri="{91240B29-F687-4f45-9708-019B960494DF}">
-              <a14:hiddenLine xmlns:a14="http://schemas.microsoft.com/office/drawing/2010/main" xmlns="" w="9525">
+              <a14:hiddenLine xmlns="" xmlns:a14="http://schemas.microsoft.com/office/drawing/2010/main" w="9525">
                 <a:solidFill>
                   <a:srgbClr val="000000"/>
                 </a:solidFill>
@@ -5497,6 +5498,310 @@
           <p:cNvPr id="2" name="Título 1">
             <a:extLst>
               <a:ext uri="{FF2B5EF4-FFF2-40B4-BE49-F238E27FC236}">
+                <a16:creationId xmlns:a16="http://schemas.microsoft.com/office/drawing/2014/main" id="{5FA8C9AF-BAA8-4DBE-A085-A7613BC77537}"/>
+              </a:ext>
+            </a:extLst>
+          </p:cNvPr>
+          <p:cNvSpPr>
+            <a:spLocks noGrp="1"/>
+          </p:cNvSpPr>
+          <p:nvPr>
+            <p:ph type="title"/>
+          </p:nvPr>
+        </p:nvSpPr>
+        <p:spPr>
+          <a:xfrm>
+            <a:off x="768069" y="447188"/>
+            <a:ext cx="10655859" cy="970450"/>
+          </a:xfrm>
+        </p:spPr>
+        <p:txBody>
+          <a:bodyPr/>
+          <a:lstStyle/>
+          <a:p>
+            <a:r>
+              <a:rPr lang="es-CO" dirty="0"/>
+              <a:t>¿CUÁL ES EL CICLO DE VIDA DE UN SCRIPT?</a:t>
+            </a:r>
+          </a:p>
+        </p:txBody>
+      </p:sp>
+      <p:sp>
+        <p:nvSpPr>
+          <p:cNvPr id="3" name="Marcador de contenido 2">
+            <a:extLst>
+              <a:ext uri="{FF2B5EF4-FFF2-40B4-BE49-F238E27FC236}">
+                <a16:creationId xmlns:a16="http://schemas.microsoft.com/office/drawing/2014/main" id="{88885E9D-4F81-4316-8673-85A25378B23A}"/>
+              </a:ext>
+            </a:extLst>
+          </p:cNvPr>
+          <p:cNvSpPr>
+            <a:spLocks noGrp="1"/>
+          </p:cNvSpPr>
+          <p:nvPr>
+            <p:ph idx="1"/>
+          </p:nvPr>
+        </p:nvSpPr>
+        <p:spPr>
+          <a:xfrm>
+            <a:off x="590112" y="2687953"/>
+            <a:ext cx="10269276" cy="3636511"/>
+          </a:xfrm>
+        </p:spPr>
+        <p:txBody>
+          <a:bodyPr>
+            <a:normAutofit fontScale="85000" lnSpcReduction="20000"/>
+          </a:bodyPr>
+          <a:lstStyle/>
+          <a:p>
+            <a:r>
+              <a:rPr lang="es-ES" dirty="0" err="1"/>
+              <a:t>OnApplicationPause</a:t>
+            </a:r>
+            <a:r>
+              <a:rPr lang="es-ES" dirty="0"/>
+              <a:t>: Esto es llamado al final del </a:t>
+            </a:r>
+            <a:r>
+              <a:rPr lang="es-ES" dirty="0" err="1"/>
+              <a:t>frame</a:t>
+            </a:r>
+            <a:r>
+              <a:rPr lang="es-ES" dirty="0"/>
+              <a:t> dónde la pausa es detectada.</a:t>
+            </a:r>
+          </a:p>
+          <a:p>
+            <a:pPr marL="0" indent="0">
+              <a:buNone/>
+            </a:pPr>
+            <a:endParaRPr lang="es-ES" dirty="0"/>
+          </a:p>
+          <a:p>
+            <a:r>
+              <a:rPr lang="es-ES" dirty="0" err="1"/>
+              <a:t>FixedUpdate</a:t>
+            </a:r>
+            <a:r>
+              <a:rPr lang="es-ES" dirty="0"/>
+              <a:t>: Puede ser llamada varias veces por </a:t>
+            </a:r>
+            <a:r>
+              <a:rPr lang="es-ES" dirty="0" err="1"/>
+              <a:t>frame</a:t>
+            </a:r>
+            <a:r>
+              <a:rPr lang="es-ES" dirty="0"/>
+              <a:t>, si la velocidad de </a:t>
+            </a:r>
+            <a:r>
+              <a:rPr lang="es-ES" dirty="0" err="1"/>
+              <a:t>frame</a:t>
+            </a:r>
+            <a:r>
+              <a:rPr lang="es-ES" dirty="0"/>
+              <a:t> es baja y puede no ser llamada entre </a:t>
+            </a:r>
+            <a:r>
+              <a:rPr lang="es-ES" dirty="0" err="1"/>
+              <a:t>frames</a:t>
+            </a:r>
+            <a:r>
+              <a:rPr lang="es-ES" dirty="0"/>
+              <a:t> en absoluto si la velocidad de </a:t>
+            </a:r>
+            <a:r>
+              <a:rPr lang="es-ES" dirty="0" err="1"/>
+              <a:t>frame</a:t>
+            </a:r>
+            <a:r>
+              <a:rPr lang="es-ES" dirty="0"/>
+              <a:t> es alta. Todos los cálculos de física y actualizaciones ocurren inmediatamente después de </a:t>
+            </a:r>
+            <a:r>
+              <a:rPr lang="es-ES" dirty="0" err="1"/>
+              <a:t>FixedUpdate</a:t>
+            </a:r>
+            <a:r>
+              <a:rPr lang="es-ES" dirty="0"/>
+              <a:t>. Esto se debe a que </a:t>
+            </a:r>
+            <a:r>
+              <a:rPr lang="es-ES" dirty="0" err="1"/>
+              <a:t>FixedUpdate</a:t>
+            </a:r>
+            <a:r>
+              <a:rPr lang="es-ES" dirty="0"/>
+              <a:t> en un temporizador fiable, independiente de la velocidad de </a:t>
+            </a:r>
+            <a:r>
+              <a:rPr lang="es-ES" dirty="0" err="1"/>
+              <a:t>frames</a:t>
+            </a:r>
+            <a:r>
+              <a:rPr lang="es-ES" dirty="0"/>
+              <a:t>.</a:t>
+            </a:r>
+          </a:p>
+          <a:p>
+            <a:pPr marL="0" indent="0">
+              <a:buNone/>
+            </a:pPr>
+            <a:endParaRPr lang="es-ES" dirty="0"/>
+          </a:p>
+          <a:p>
+            <a:r>
+              <a:rPr lang="es-ES" dirty="0" err="1"/>
+              <a:t>Update</a:t>
+            </a:r>
+            <a:r>
+              <a:rPr lang="es-ES" dirty="0"/>
+              <a:t>: </a:t>
+            </a:r>
+            <a:r>
+              <a:rPr lang="es-ES" dirty="0" err="1"/>
+              <a:t>Update</a:t>
+            </a:r>
+            <a:r>
+              <a:rPr lang="es-ES" dirty="0"/>
+              <a:t> se llama una vez por </a:t>
+            </a:r>
+            <a:r>
+              <a:rPr lang="es-ES" dirty="0" err="1"/>
+              <a:t>frame</a:t>
+            </a:r>
+            <a:r>
+              <a:rPr lang="es-ES" dirty="0"/>
+              <a:t>. Es la función principal para las actualizaciones de </a:t>
+            </a:r>
+            <a:r>
+              <a:rPr lang="es-ES" dirty="0" err="1"/>
+              <a:t>frames</a:t>
+            </a:r>
+            <a:r>
+              <a:rPr lang="es-ES" dirty="0"/>
+              <a:t>.</a:t>
+            </a:r>
+          </a:p>
+          <a:p>
+            <a:pPr marL="0" indent="0">
+              <a:buNone/>
+            </a:pPr>
+            <a:endParaRPr lang="es-ES" dirty="0"/>
+          </a:p>
+          <a:p>
+            <a:r>
+              <a:rPr lang="es-ES" dirty="0" err="1"/>
+              <a:t>LateUpdate</a:t>
+            </a:r>
+            <a:r>
+              <a:rPr lang="es-ES" dirty="0"/>
+              <a:t>: </a:t>
+            </a:r>
+            <a:r>
+              <a:rPr lang="es-ES" dirty="0" err="1"/>
+              <a:t>LateUpdate</a:t>
+            </a:r>
+            <a:r>
+              <a:rPr lang="es-ES" dirty="0"/>
+              <a:t> es llamada una vez por </a:t>
+            </a:r>
+            <a:r>
+              <a:rPr lang="es-ES" dirty="0" err="1"/>
+              <a:t>frame</a:t>
+            </a:r>
+            <a:r>
+              <a:rPr lang="es-ES" dirty="0"/>
+              <a:t>, después de que </a:t>
+            </a:r>
+            <a:r>
+              <a:rPr lang="es-ES" dirty="0" err="1"/>
+              <a:t>Update</a:t>
+            </a:r>
+            <a:r>
+              <a:rPr lang="es-ES" dirty="0"/>
+              <a:t> haya finalizado. Cualquier cálculo que sea realizado en </a:t>
+            </a:r>
+            <a:r>
+              <a:rPr lang="es-ES" dirty="0" err="1"/>
+              <a:t>Update</a:t>
+            </a:r>
+            <a:r>
+              <a:rPr lang="es-ES" dirty="0"/>
+              <a:t> será completado cuando </a:t>
+            </a:r>
+            <a:r>
+              <a:rPr lang="es-ES" dirty="0" err="1"/>
+              <a:t>LateUpdate</a:t>
+            </a:r>
+            <a:r>
+              <a:rPr lang="es-ES" dirty="0"/>
+              <a:t> comience. Un uso común para </a:t>
+            </a:r>
+            <a:r>
+              <a:rPr lang="es-ES" dirty="0" err="1"/>
+              <a:t>LateUpdate</a:t>
+            </a:r>
+            <a:r>
+              <a:rPr lang="es-ES" dirty="0"/>
+              <a:t> sería una cámara de tercera persona que sigue. </a:t>
+            </a:r>
+          </a:p>
+          <a:p>
+            <a:pPr marL="0" indent="0">
+              <a:buNone/>
+            </a:pPr>
+            <a:r>
+              <a:rPr lang="es-ES" dirty="0"/>
+              <a:t>Estas son solo las funciones más importantes, el orden completo es muy extenso.</a:t>
+            </a:r>
+          </a:p>
+          <a:p>
+            <a:endParaRPr lang="es-ES" dirty="0"/>
+          </a:p>
+          <a:p>
+            <a:pPr marL="0" indent="0">
+              <a:buNone/>
+            </a:pPr>
+            <a:endParaRPr lang="es-CO" dirty="0"/>
+          </a:p>
+        </p:txBody>
+      </p:sp>
+    </p:spTree>
+    <p:extLst>
+      <p:ext uri="{BB962C8B-B14F-4D97-AF65-F5344CB8AC3E}">
+        <p14:creationId xmlns:p14="http://schemas.microsoft.com/office/powerpoint/2010/main" val="817428127"/>
+      </p:ext>
+    </p:extLst>
+  </p:cSld>
+  <p:clrMapOvr>
+    <a:masterClrMapping/>
+  </p:clrMapOvr>
+</p:sld>
+</file>
+
+<file path=ppt/slides/slide11.xml><?xml version="1.0" encoding="utf-8"?>
+<p:sld xmlns:a="http://schemas.openxmlformats.org/drawingml/2006/main" xmlns:r="http://schemas.openxmlformats.org/officeDocument/2006/relationships" xmlns:p="http://schemas.openxmlformats.org/presentationml/2006/main">
+  <p:cSld>
+    <p:spTree>
+      <p:nvGrpSpPr>
+        <p:cNvPr id="1" name=""/>
+        <p:cNvGrpSpPr/>
+        <p:nvPr/>
+      </p:nvGrpSpPr>
+      <p:grpSpPr>
+        <a:xfrm>
+          <a:off x="0" y="0"/>
+          <a:ext cx="0" cy="0"/>
+          <a:chOff x="0" y="0"/>
+          <a:chExt cx="0" cy="0"/>
+        </a:xfrm>
+      </p:grpSpPr>
+      <p:sp>
+        <p:nvSpPr>
+          <p:cNvPr id="2" name="Título 1">
+            <a:extLst>
+              <a:ext uri="{FF2B5EF4-FFF2-40B4-BE49-F238E27FC236}">
                 <a16:creationId xmlns:a16="http://schemas.microsoft.com/office/drawing/2014/main" id="{5F94284C-2EFD-4684-A8BF-8EBE201F8ED5}"/>
               </a:ext>
             </a:extLst>
@@ -5603,7 +5908,7 @@
 </p:sld>
 </file>
 
-<file path=ppt/slides/slide11.xml><?xml version="1.0" encoding="utf-8"?>
+<file path=ppt/slides/slide12.xml><?xml version="1.0" encoding="utf-8"?>
 <p:sld xmlns:a="http://schemas.openxmlformats.org/drawingml/2006/main" xmlns:r="http://schemas.openxmlformats.org/officeDocument/2006/relationships" xmlns:p="http://schemas.openxmlformats.org/presentationml/2006/main">
   <p:cSld>
     <p:spTree>
@@ -5884,6 +6189,124 @@
 </file>
 
 <file path=ppt/slides/slide3.xml><?xml version="1.0" encoding="utf-8"?>
+<p:sld xmlns:a="http://schemas.openxmlformats.org/drawingml/2006/main" xmlns:r="http://schemas.openxmlformats.org/officeDocument/2006/relationships" xmlns:p="http://schemas.openxmlformats.org/presentationml/2006/main">
+  <p:cSld>
+    <p:spTree>
+      <p:nvGrpSpPr>
+        <p:cNvPr id="1" name=""/>
+        <p:cNvGrpSpPr/>
+        <p:nvPr/>
+      </p:nvGrpSpPr>
+      <p:grpSpPr>
+        <a:xfrm>
+          <a:off x="0" y="0"/>
+          <a:ext cx="0" cy="0"/>
+          <a:chOff x="0" y="0"/>
+          <a:chExt cx="0" cy="0"/>
+        </a:xfrm>
+      </p:grpSpPr>
+      <p:sp>
+        <p:nvSpPr>
+          <p:cNvPr id="2" name="Título 1">
+            <a:extLst>
+              <a:ext uri="{FF2B5EF4-FFF2-40B4-BE49-F238E27FC236}">
+                <a16:creationId xmlns:a16="http://schemas.microsoft.com/office/drawing/2014/main" id="{295CCBF7-1CAE-481B-91F9-835CDB8A244B}"/>
+              </a:ext>
+            </a:extLst>
+          </p:cNvPr>
+          <p:cNvSpPr>
+            <a:spLocks noGrp="1"/>
+          </p:cNvSpPr>
+          <p:nvPr>
+            <p:ph type="title"/>
+          </p:nvPr>
+        </p:nvSpPr>
+        <p:spPr/>
+        <p:txBody>
+          <a:bodyPr/>
+          <a:lstStyle/>
+          <a:p>
+            <a:r>
+              <a:rPr lang="es-CO" dirty="0"/>
+              <a:t>¿QUÉ ES UN EVENT EN C#?</a:t>
+            </a:r>
+          </a:p>
+        </p:txBody>
+      </p:sp>
+      <p:pic>
+        <p:nvPicPr>
+          <p:cNvPr id="4" name="Imagen 3">
+            <a:extLst>
+              <a:ext uri="{FF2B5EF4-FFF2-40B4-BE49-F238E27FC236}">
+                <a16:creationId xmlns:a16="http://schemas.microsoft.com/office/drawing/2014/main" id="{14F0BC50-29CD-47E1-A3BC-6FE77757CFD3}"/>
+              </a:ext>
+            </a:extLst>
+          </p:cNvPr>
+          <p:cNvPicPr>
+            <a:picLocks noChangeAspect="1"/>
+          </p:cNvPicPr>
+          <p:nvPr/>
+        </p:nvPicPr>
+        <p:blipFill>
+          <a:blip r:embed="rId2"/>
+          <a:stretch>
+            <a:fillRect/>
+          </a:stretch>
+        </p:blipFill>
+        <p:spPr>
+          <a:xfrm>
+            <a:off x="178063" y="2671481"/>
+            <a:ext cx="6948878" cy="3474439"/>
+          </a:xfrm>
+          <a:prstGeom prst="rect">
+            <a:avLst/>
+          </a:prstGeom>
+        </p:spPr>
+      </p:pic>
+      <p:pic>
+        <p:nvPicPr>
+          <p:cNvPr id="6" name="Imagen 5">
+            <a:extLst>
+              <a:ext uri="{FF2B5EF4-FFF2-40B4-BE49-F238E27FC236}">
+                <a16:creationId xmlns:a16="http://schemas.microsoft.com/office/drawing/2014/main" id="{875E641E-BFE0-4664-83E5-739B8DFEC4CC}"/>
+              </a:ext>
+            </a:extLst>
+          </p:cNvPr>
+          <p:cNvPicPr>
+            <a:picLocks noChangeAspect="1"/>
+          </p:cNvPicPr>
+          <p:nvPr/>
+        </p:nvPicPr>
+        <p:blipFill>
+          <a:blip r:embed="rId3"/>
+          <a:stretch>
+            <a:fillRect/>
+          </a:stretch>
+        </p:blipFill>
+        <p:spPr>
+          <a:xfrm>
+            <a:off x="6609137" y="2890014"/>
+            <a:ext cx="5306188" cy="3255906"/>
+          </a:xfrm>
+          <a:prstGeom prst="rect">
+            <a:avLst/>
+          </a:prstGeom>
+        </p:spPr>
+      </p:pic>
+    </p:spTree>
+    <p:extLst>
+      <p:ext uri="{BB962C8B-B14F-4D97-AF65-F5344CB8AC3E}">
+        <p14:creationId xmlns:p14="http://schemas.microsoft.com/office/powerpoint/2010/main" val="609154780"/>
+      </p:ext>
+    </p:extLst>
+  </p:cSld>
+  <p:clrMapOvr>
+    <a:masterClrMapping/>
+  </p:clrMapOvr>
+</p:sld>
+</file>
+
+<file path=ppt/slides/slide4.xml><?xml version="1.0" encoding="utf-8"?>
 <p:sld xmlns:a="http://schemas.openxmlformats.org/drawingml/2006/main" xmlns:r="http://schemas.openxmlformats.org/officeDocument/2006/relationships" xmlns:p="http://schemas.openxmlformats.org/presentationml/2006/main">
   <p:cSld>
     <p:spTree>
@@ -6001,7 +6424,7 @@
 </p:sld>
 </file>
 
-<file path=ppt/slides/slide4.xml><?xml version="1.0" encoding="utf-8"?>
+<file path=ppt/slides/slide5.xml><?xml version="1.0" encoding="utf-8"?>
 <p:sld xmlns:a="http://schemas.openxmlformats.org/drawingml/2006/main" xmlns:r="http://schemas.openxmlformats.org/officeDocument/2006/relationships" xmlns:p="http://schemas.openxmlformats.org/presentationml/2006/main">
   <p:cSld>
     <p:spTree>
@@ -6250,7 +6673,7 @@
 </p:sld>
 </file>
 
-<file path=ppt/slides/slide5.xml><?xml version="1.0" encoding="utf-8"?>
+<file path=ppt/slides/slide6.xml><?xml version="1.0" encoding="utf-8"?>
 <p:sld xmlns:a="http://schemas.openxmlformats.org/drawingml/2006/main" xmlns:r="http://schemas.openxmlformats.org/officeDocument/2006/relationships" xmlns:p="http://schemas.openxmlformats.org/presentationml/2006/main">
   <p:cSld>
     <p:spTree>
@@ -6617,7 +7040,7 @@
 </p:sld>
 </file>
 
-<file path=ppt/slides/slide6.xml><?xml version="1.0" encoding="utf-8"?>
+<file path=ppt/slides/slide7.xml><?xml version="1.0" encoding="utf-8"?>
 <p:sld xmlns:a="http://schemas.openxmlformats.org/drawingml/2006/main" xmlns:r="http://schemas.openxmlformats.org/officeDocument/2006/relationships" xmlns:p="http://schemas.openxmlformats.org/presentationml/2006/main">
   <p:cSld>
     <p:spTree>
@@ -6781,7 +7204,7 @@
 </p:sld>
 </file>
 
-<file path=ppt/slides/slide7.xml><?xml version="1.0" encoding="utf-8"?>
+<file path=ppt/slides/slide8.xml><?xml version="1.0" encoding="utf-8"?>
 <p:sld xmlns:a="http://schemas.openxmlformats.org/drawingml/2006/main" xmlns:r="http://schemas.openxmlformats.org/officeDocument/2006/relationships" xmlns:p="http://schemas.openxmlformats.org/presentationml/2006/main">
   <p:cSld>
     <p:spTree>
@@ -6995,243 +7418,6 @@
 </p:sld>
 </file>
 
-<file path=ppt/slides/slide8.xml><?xml version="1.0" encoding="utf-8"?>
-<p:sld xmlns:a="http://schemas.openxmlformats.org/drawingml/2006/main" xmlns:r="http://schemas.openxmlformats.org/officeDocument/2006/relationships" xmlns:p="http://schemas.openxmlformats.org/presentationml/2006/main">
-  <p:cSld>
-    <p:spTree>
-      <p:nvGrpSpPr>
-        <p:cNvPr id="1" name=""/>
-        <p:cNvGrpSpPr/>
-        <p:nvPr/>
-      </p:nvGrpSpPr>
-      <p:grpSpPr>
-        <a:xfrm>
-          <a:off x="0" y="0"/>
-          <a:ext cx="0" cy="0"/>
-          <a:chOff x="0" y="0"/>
-          <a:chExt cx="0" cy="0"/>
-        </a:xfrm>
-      </p:grpSpPr>
-      <p:sp>
-        <p:nvSpPr>
-          <p:cNvPr id="2" name="Título 1">
-            <a:extLst>
-              <a:ext uri="{FF2B5EF4-FFF2-40B4-BE49-F238E27FC236}">
-                <a16:creationId xmlns:a16="http://schemas.microsoft.com/office/drawing/2014/main" id="{5FA8C9AF-BAA8-4DBE-A085-A7613BC77537}"/>
-              </a:ext>
-            </a:extLst>
-          </p:cNvPr>
-          <p:cNvSpPr>
-            <a:spLocks noGrp="1"/>
-          </p:cNvSpPr>
-          <p:nvPr>
-            <p:ph type="title"/>
-          </p:nvPr>
-        </p:nvSpPr>
-        <p:spPr>
-          <a:xfrm>
-            <a:off x="768069" y="447188"/>
-            <a:ext cx="10655859" cy="970450"/>
-          </a:xfrm>
-        </p:spPr>
-        <p:txBody>
-          <a:bodyPr/>
-          <a:lstStyle/>
-          <a:p>
-            <a:r>
-              <a:rPr lang="es-CO" dirty="0"/>
-              <a:t>¿CUÁL ES EL CICLO DE VIDA DE UN SCRIPT?</a:t>
-            </a:r>
-          </a:p>
-        </p:txBody>
-      </p:sp>
-      <p:sp>
-        <p:nvSpPr>
-          <p:cNvPr id="3" name="Marcador de contenido 2">
-            <a:extLst>
-              <a:ext uri="{FF2B5EF4-FFF2-40B4-BE49-F238E27FC236}">
-                <a16:creationId xmlns:a16="http://schemas.microsoft.com/office/drawing/2014/main" id="{88885E9D-4F81-4316-8673-85A25378B23A}"/>
-              </a:ext>
-            </a:extLst>
-          </p:cNvPr>
-          <p:cNvSpPr>
-            <a:spLocks noGrp="1"/>
-          </p:cNvSpPr>
-          <p:nvPr>
-            <p:ph idx="1"/>
-          </p:nvPr>
-        </p:nvSpPr>
-        <p:spPr>
-          <a:xfrm>
-            <a:off x="607046" y="2774301"/>
-            <a:ext cx="10269276" cy="3636511"/>
-          </a:xfrm>
-        </p:spPr>
-        <p:txBody>
-          <a:bodyPr>
-            <a:normAutofit fontScale="85000" lnSpcReduction="20000"/>
-          </a:bodyPr>
-          <a:lstStyle/>
-          <a:p>
-            <a:pPr marL="0" indent="0">
-              <a:buNone/>
-            </a:pPr>
-            <a:r>
-              <a:rPr lang="es-ES" dirty="0"/>
-              <a:t>El ciclo de vida de un script en </a:t>
-            </a:r>
-            <a:r>
-              <a:rPr lang="es-ES" dirty="0" err="1"/>
-              <a:t>unity</a:t>
-            </a:r>
-            <a:r>
-              <a:rPr lang="es-ES" dirty="0"/>
-              <a:t> se refiere a el orden en el que se ejecutan las funciones del script. Orden:</a:t>
-            </a:r>
-          </a:p>
-          <a:p>
-            <a:endParaRPr lang="es-ES" dirty="0"/>
-          </a:p>
-          <a:p>
-            <a:r>
-              <a:rPr lang="es-ES" dirty="0" err="1"/>
-              <a:t>Reset</a:t>
-            </a:r>
-            <a:r>
-              <a:rPr lang="es-ES" dirty="0"/>
-              <a:t>: El </a:t>
-            </a:r>
-            <a:r>
-              <a:rPr lang="es-ES" dirty="0" err="1"/>
-              <a:t>reset</a:t>
-            </a:r>
-            <a:r>
-              <a:rPr lang="es-ES" dirty="0"/>
-              <a:t> es llamado para inicializar las propiedades de script cuando es por primera vez adjuntado al objeto y también cuando el comando </a:t>
-            </a:r>
-            <a:r>
-              <a:rPr lang="es-ES" dirty="0" err="1"/>
-              <a:t>Reset</a:t>
-            </a:r>
-            <a:r>
-              <a:rPr lang="es-ES" dirty="0"/>
-              <a:t> es utilizado.</a:t>
-            </a:r>
-          </a:p>
-          <a:p>
-            <a:endParaRPr lang="es-ES" dirty="0"/>
-          </a:p>
-          <a:p>
-            <a:r>
-              <a:rPr lang="es-ES" dirty="0" err="1"/>
-              <a:t>Awake</a:t>
-            </a:r>
-            <a:r>
-              <a:rPr lang="es-ES" dirty="0"/>
-              <a:t>: Esta función siempre se llama antes de cualquier función </a:t>
-            </a:r>
-            <a:r>
-              <a:rPr lang="es-ES" dirty="0" err="1"/>
-              <a:t>Start</a:t>
-            </a:r>
-            <a:r>
-              <a:rPr lang="es-ES" dirty="0"/>
-              <a:t> y también justo después de que un </a:t>
-            </a:r>
-            <a:r>
-              <a:rPr lang="es-ES" dirty="0" err="1"/>
-              <a:t>prefab</a:t>
-            </a:r>
-            <a:r>
-              <a:rPr lang="es-ES" dirty="0"/>
-              <a:t> es instanciado.</a:t>
-            </a:r>
-          </a:p>
-          <a:p>
-            <a:endParaRPr lang="es-ES" dirty="0"/>
-          </a:p>
-          <a:p>
-            <a:r>
-              <a:rPr lang="es-ES" dirty="0" err="1"/>
-              <a:t>OnEnable</a:t>
-            </a:r>
-            <a:r>
-              <a:rPr lang="es-ES" dirty="0"/>
-              <a:t>: Esta función es llamada justo después de que el objeto es activado. Esto sucede cuando una instancia de </a:t>
-            </a:r>
-            <a:r>
-              <a:rPr lang="es-ES" dirty="0" err="1"/>
-              <a:t>MonoBehaviour</a:t>
-            </a:r>
-            <a:r>
-              <a:rPr lang="es-ES" dirty="0"/>
-              <a:t> es creada, tal como cuando un nivel es cargado o un </a:t>
-            </a:r>
-            <a:r>
-              <a:rPr lang="es-ES" dirty="0" err="1"/>
-              <a:t>GameObject</a:t>
-            </a:r>
-            <a:r>
-              <a:rPr lang="es-ES" dirty="0"/>
-              <a:t> con un componente script es instanciado.</a:t>
-            </a:r>
-          </a:p>
-          <a:p>
-            <a:r>
-              <a:rPr lang="es-ES" dirty="0" err="1"/>
-              <a:t>Start</a:t>
-            </a:r>
-            <a:r>
-              <a:rPr lang="es-ES" dirty="0"/>
-              <a:t>: </a:t>
-            </a:r>
-            <a:r>
-              <a:rPr lang="es-ES" dirty="0" err="1"/>
-              <a:t>Start</a:t>
-            </a:r>
-            <a:r>
-              <a:rPr lang="es-ES" dirty="0"/>
-              <a:t> es llamado antes de la primera actualización de </a:t>
-            </a:r>
-            <a:r>
-              <a:rPr lang="es-ES" dirty="0" err="1"/>
-              <a:t>frame</a:t>
-            </a:r>
-            <a:r>
-              <a:rPr lang="es-ES" dirty="0"/>
-              <a:t> solo si la instancia del script está activada.</a:t>
-            </a:r>
-          </a:p>
-          <a:p>
-            <a:pPr marL="0" indent="0">
-              <a:buNone/>
-            </a:pPr>
-            <a:endParaRPr lang="es-ES" dirty="0"/>
-          </a:p>
-          <a:p>
-            <a:endParaRPr lang="es-ES" dirty="0"/>
-          </a:p>
-          <a:p>
-            <a:pPr marL="0" indent="0">
-              <a:buNone/>
-            </a:pPr>
-            <a:endParaRPr lang="es-CO" dirty="0"/>
-          </a:p>
-        </p:txBody>
-      </p:sp>
-    </p:spTree>
-    <p:extLst>
-      <p:ext uri="{BB962C8B-B14F-4D97-AF65-F5344CB8AC3E}">
-        <p14:creationId xmlns:p14="http://schemas.microsoft.com/office/powerpoint/2010/main" val="1906147471"/>
-      </p:ext>
-    </p:extLst>
-  </p:cSld>
-  <p:clrMapOvr>
-    <a:masterClrMapping/>
-  </p:clrMapOvr>
-</p:sld>
-</file>
-
 <file path=ppt/slides/slide9.xml><?xml version="1.0" encoding="utf-8"?>
 <p:sld xmlns:a="http://schemas.openxmlformats.org/drawingml/2006/main" xmlns:r="http://schemas.openxmlformats.org/officeDocument/2006/relationships" xmlns:p="http://schemas.openxmlformats.org/presentationml/2006/main">
   <p:cSld>
@@ -7300,7 +7486,7 @@
         </p:nvSpPr>
         <p:spPr>
           <a:xfrm>
-            <a:off x="590112" y="2687953"/>
+            <a:off x="607046" y="2774301"/>
             <a:ext cx="10269276" cy="3636511"/>
           </a:xfrm>
         </p:spPr>
@@ -7310,13 +7496,125 @@
           </a:bodyPr>
           <a:lstStyle/>
           <a:p>
+            <a:pPr marL="0" indent="0">
+              <a:buNone/>
+            </a:pPr>
+            <a:r>
+              <a:rPr lang="es-ES" dirty="0"/>
+              <a:t>El ciclo de vida de un script en </a:t>
+            </a:r>
             <a:r>
               <a:rPr lang="es-ES" dirty="0" err="1"/>
-              <a:t>OnApplicationPause</a:t>
+              <a:t>unity</a:t>
             </a:r>
             <a:r>
               <a:rPr lang="es-ES" dirty="0"/>
-              <a:t>: Esto es llamado al final del </a:t>
+              <a:t> se refiere a el orden en el que se ejecutan las funciones del script. Orden:</a:t>
+            </a:r>
+          </a:p>
+          <a:p>
+            <a:endParaRPr lang="es-ES" dirty="0"/>
+          </a:p>
+          <a:p>
+            <a:r>
+              <a:rPr lang="es-ES" dirty="0" err="1"/>
+              <a:t>Reset</a:t>
+            </a:r>
+            <a:r>
+              <a:rPr lang="es-ES" dirty="0"/>
+              <a:t>: El </a:t>
+            </a:r>
+            <a:r>
+              <a:rPr lang="es-ES" dirty="0" err="1"/>
+              <a:t>reset</a:t>
+            </a:r>
+            <a:r>
+              <a:rPr lang="es-ES" dirty="0"/>
+              <a:t> es llamado para inicializar las propiedades de script cuando es por primera vez adjuntado al objeto y también cuando el comando </a:t>
+            </a:r>
+            <a:r>
+              <a:rPr lang="es-ES" dirty="0" err="1"/>
+              <a:t>Reset</a:t>
+            </a:r>
+            <a:r>
+              <a:rPr lang="es-ES" dirty="0"/>
+              <a:t> es utilizado.</a:t>
+            </a:r>
+          </a:p>
+          <a:p>
+            <a:endParaRPr lang="es-ES" dirty="0"/>
+          </a:p>
+          <a:p>
+            <a:r>
+              <a:rPr lang="es-ES" dirty="0" err="1"/>
+              <a:t>Awake</a:t>
+            </a:r>
+            <a:r>
+              <a:rPr lang="es-ES" dirty="0"/>
+              <a:t>: Esta función siempre se llama antes de cualquier función </a:t>
+            </a:r>
+            <a:r>
+              <a:rPr lang="es-ES" dirty="0" err="1"/>
+              <a:t>Start</a:t>
+            </a:r>
+            <a:r>
+              <a:rPr lang="es-ES" dirty="0"/>
+              <a:t> y también justo después de que un </a:t>
+            </a:r>
+            <a:r>
+              <a:rPr lang="es-ES" dirty="0" err="1"/>
+              <a:t>prefab</a:t>
+            </a:r>
+            <a:r>
+              <a:rPr lang="es-ES" dirty="0"/>
+              <a:t> es instanciado.</a:t>
+            </a:r>
+          </a:p>
+          <a:p>
+            <a:endParaRPr lang="es-ES" dirty="0"/>
+          </a:p>
+          <a:p>
+            <a:r>
+              <a:rPr lang="es-ES" dirty="0" err="1"/>
+              <a:t>OnEnable</a:t>
+            </a:r>
+            <a:r>
+              <a:rPr lang="es-ES" dirty="0"/>
+              <a:t>: Esta función es llamada justo después de que el objeto es activado. Esto sucede cuando una instancia de </a:t>
+            </a:r>
+            <a:r>
+              <a:rPr lang="es-ES" dirty="0" err="1"/>
+              <a:t>MonoBehaviour</a:t>
+            </a:r>
+            <a:r>
+              <a:rPr lang="es-ES" dirty="0"/>
+              <a:t> es creada, tal como cuando un nivel es cargado o un </a:t>
+            </a:r>
+            <a:r>
+              <a:rPr lang="es-ES" dirty="0" err="1"/>
+              <a:t>GameObject</a:t>
+            </a:r>
+            <a:r>
+              <a:rPr lang="es-ES" dirty="0"/>
+              <a:t> con un componente script es instanciado.</a:t>
+            </a:r>
+          </a:p>
+          <a:p>
+            <a:r>
+              <a:rPr lang="es-ES" dirty="0" err="1"/>
+              <a:t>Start</a:t>
+            </a:r>
+            <a:r>
+              <a:rPr lang="es-ES" dirty="0"/>
+              <a:t>: </a:t>
+            </a:r>
+            <a:r>
+              <a:rPr lang="es-ES" dirty="0" err="1"/>
+              <a:t>Start</a:t>
+            </a:r>
+            <a:r>
+              <a:rPr lang="es-ES" dirty="0"/>
+              <a:t> es llamado antes de la primera actualización de </a:t>
             </a:r>
             <a:r>
               <a:rPr lang="es-ES" dirty="0" err="1"/>
@@ -7324,7 +7622,7 @@
             </a:r>
             <a:r>
               <a:rPr lang="es-ES" dirty="0"/>
-              <a:t> dónde la pausa es detectada.</a:t>
+              <a:t> solo si la instancia del script está activada.</a:t>
             </a:r>
           </a:p>
           <a:p>
@@ -7332,185 +7630,6 @@
               <a:buNone/>
             </a:pPr>
             <a:endParaRPr lang="es-ES" dirty="0"/>
-          </a:p>
-          <a:p>
-            <a:r>
-              <a:rPr lang="es-ES" dirty="0" err="1"/>
-              <a:t>FixedUpdate</a:t>
-            </a:r>
-            <a:r>
-              <a:rPr lang="es-ES" dirty="0"/>
-              <a:t>: Puede ser llamada varias veces por </a:t>
-            </a:r>
-            <a:r>
-              <a:rPr lang="es-ES" dirty="0" err="1"/>
-              <a:t>frame</a:t>
-            </a:r>
-            <a:r>
-              <a:rPr lang="es-ES" dirty="0"/>
-              <a:t>, si la velocidad de </a:t>
-            </a:r>
-            <a:r>
-              <a:rPr lang="es-ES" dirty="0" err="1"/>
-              <a:t>frame</a:t>
-            </a:r>
-            <a:r>
-              <a:rPr lang="es-ES" dirty="0"/>
-              <a:t> es baja y puede no ser llamada entre </a:t>
-            </a:r>
-            <a:r>
-              <a:rPr lang="es-ES" dirty="0" err="1"/>
-              <a:t>frames</a:t>
-            </a:r>
-            <a:r>
-              <a:rPr lang="es-ES" dirty="0"/>
-              <a:t> en absoluto si la velocidad de </a:t>
-            </a:r>
-            <a:r>
-              <a:rPr lang="es-ES" dirty="0" err="1"/>
-              <a:t>frame</a:t>
-            </a:r>
-            <a:r>
-              <a:rPr lang="es-ES" dirty="0"/>
-              <a:t> es alta. Todos los cálculos de física y actualizaciones ocurren inmediatamente después de </a:t>
-            </a:r>
-            <a:r>
-              <a:rPr lang="es-ES" dirty="0" err="1"/>
-              <a:t>FixedUpdate</a:t>
-            </a:r>
-            <a:r>
-              <a:rPr lang="es-ES" dirty="0"/>
-              <a:t>. Esto se debe a que </a:t>
-            </a:r>
-            <a:r>
-              <a:rPr lang="es-ES" dirty="0" err="1"/>
-              <a:t>FixedUpdate</a:t>
-            </a:r>
-            <a:r>
-              <a:rPr lang="es-ES" dirty="0"/>
-              <a:t> en un temporizador fiable, independiente de la velocidad de </a:t>
-            </a:r>
-            <a:r>
-              <a:rPr lang="es-ES" dirty="0" err="1"/>
-              <a:t>frames</a:t>
-            </a:r>
-            <a:r>
-              <a:rPr lang="es-ES" dirty="0"/>
-              <a:t>.</a:t>
-            </a:r>
-          </a:p>
-          <a:p>
-            <a:pPr marL="0" indent="0">
-              <a:buNone/>
-            </a:pPr>
-            <a:endParaRPr lang="es-ES" dirty="0"/>
-          </a:p>
-          <a:p>
-            <a:r>
-              <a:rPr lang="es-ES" dirty="0" err="1"/>
-              <a:t>Update</a:t>
-            </a:r>
-            <a:r>
-              <a:rPr lang="es-ES" dirty="0"/>
-              <a:t>: </a:t>
-            </a:r>
-            <a:r>
-              <a:rPr lang="es-ES" dirty="0" err="1"/>
-              <a:t>Update</a:t>
-            </a:r>
-            <a:r>
-              <a:rPr lang="es-ES" dirty="0"/>
-              <a:t> se llama una vez por </a:t>
-            </a:r>
-            <a:r>
-              <a:rPr lang="es-ES" dirty="0" err="1"/>
-              <a:t>frame</a:t>
-            </a:r>
-            <a:r>
-              <a:rPr lang="es-ES" dirty="0"/>
-              <a:t>. Es la función principal para las actualizaciones de </a:t>
-            </a:r>
-            <a:r>
-              <a:rPr lang="es-ES" dirty="0" err="1"/>
-              <a:t>frames</a:t>
-            </a:r>
-            <a:r>
-              <a:rPr lang="es-ES" dirty="0"/>
-              <a:t>.</a:t>
-            </a:r>
-          </a:p>
-          <a:p>
-            <a:pPr marL="0" indent="0">
-              <a:buNone/>
-            </a:pPr>
-            <a:endParaRPr lang="es-ES" dirty="0"/>
-          </a:p>
-          <a:p>
-            <a:r>
-              <a:rPr lang="es-ES" dirty="0" err="1"/>
-              <a:t>LateUpdate</a:t>
-            </a:r>
-            <a:r>
-              <a:rPr lang="es-ES" dirty="0"/>
-              <a:t>: </a:t>
-            </a:r>
-            <a:r>
-              <a:rPr lang="es-ES" dirty="0" err="1"/>
-              <a:t>LateUpdate</a:t>
-            </a:r>
-            <a:r>
-              <a:rPr lang="es-ES" dirty="0"/>
-              <a:t> es llamada una vez por </a:t>
-            </a:r>
-            <a:r>
-              <a:rPr lang="es-ES" dirty="0" err="1"/>
-              <a:t>frame</a:t>
-            </a:r>
-            <a:r>
-              <a:rPr lang="es-ES" dirty="0"/>
-              <a:t>, después de que </a:t>
-            </a:r>
-            <a:r>
-              <a:rPr lang="es-ES" dirty="0" err="1"/>
-              <a:t>Update</a:t>
-            </a:r>
-            <a:r>
-              <a:rPr lang="es-ES" dirty="0"/>
-              <a:t> haya finalizado. Cualquier cálculo que sea realizado en </a:t>
-            </a:r>
-            <a:r>
-              <a:rPr lang="es-ES" dirty="0" err="1"/>
-              <a:t>Update</a:t>
-            </a:r>
-            <a:r>
-              <a:rPr lang="es-ES" dirty="0"/>
-              <a:t> será completado cuando </a:t>
-            </a:r>
-            <a:r>
-              <a:rPr lang="es-ES" dirty="0" err="1"/>
-              <a:t>LateUpdate</a:t>
-            </a:r>
-            <a:r>
-              <a:rPr lang="es-ES" dirty="0"/>
-              <a:t> comience. Un uso común para </a:t>
-            </a:r>
-            <a:r>
-              <a:rPr lang="es-ES" dirty="0" err="1"/>
-              <a:t>LateUpdate</a:t>
-            </a:r>
-            <a:r>
-              <a:rPr lang="es-ES" dirty="0"/>
-              <a:t> sería una cámara de tercera persona que sigue. </a:t>
-            </a:r>
-          </a:p>
-          <a:p>
-            <a:pPr marL="0" indent="0">
-              <a:buNone/>
-            </a:pPr>
-            <a:r>
-              <a:rPr lang="es-ES" dirty="0"/>
-              <a:t>Estas son solo las funciones más importantes, el orden completo es muy extenso.</a:t>
-            </a:r>
           </a:p>
           <a:p>
             <a:endParaRPr lang="es-ES" dirty="0"/>
@@ -7526,7 +7645,7 @@
     </p:spTree>
     <p:extLst>
       <p:ext uri="{BB962C8B-B14F-4D97-AF65-F5344CB8AC3E}">
-        <p14:creationId xmlns:p14="http://schemas.microsoft.com/office/powerpoint/2010/main" val="817428127"/>
+        <p14:creationId xmlns:p14="http://schemas.microsoft.com/office/powerpoint/2010/main" val="1906147471"/>
       </p:ext>
     </p:extLst>
   </p:cSld>

</xml_diff>